<commit_message>
Adding some slides, fix the mistakes
</commit_message>
<xml_diff>
--- a/Zoo Animal Classification.pptx
+++ b/Zoo Animal Classification.pptx
@@ -6,22 +6,24 @@
   </p:sldMasterIdLst>
   <p:sldIdLst>
     <p:sldId id="256" r:id="rId2"/>
-    <p:sldId id="258" r:id="rId3"/>
-    <p:sldId id="259" r:id="rId4"/>
-    <p:sldId id="260" r:id="rId5"/>
-    <p:sldId id="261" r:id="rId6"/>
-    <p:sldId id="262" r:id="rId7"/>
-    <p:sldId id="263" r:id="rId8"/>
-    <p:sldId id="264" r:id="rId9"/>
-    <p:sldId id="266" r:id="rId10"/>
-    <p:sldId id="265" r:id="rId11"/>
-    <p:sldId id="267" r:id="rId12"/>
-    <p:sldId id="272" r:id="rId13"/>
-    <p:sldId id="270" r:id="rId14"/>
-    <p:sldId id="268" r:id="rId15"/>
-    <p:sldId id="271" r:id="rId16"/>
-    <p:sldId id="269" r:id="rId17"/>
-    <p:sldId id="273" r:id="rId18"/>
+    <p:sldId id="275" r:id="rId3"/>
+    <p:sldId id="258" r:id="rId4"/>
+    <p:sldId id="274" r:id="rId5"/>
+    <p:sldId id="259" r:id="rId6"/>
+    <p:sldId id="260" r:id="rId7"/>
+    <p:sldId id="261" r:id="rId8"/>
+    <p:sldId id="262" r:id="rId9"/>
+    <p:sldId id="263" r:id="rId10"/>
+    <p:sldId id="264" r:id="rId11"/>
+    <p:sldId id="266" r:id="rId12"/>
+    <p:sldId id="265" r:id="rId13"/>
+    <p:sldId id="267" r:id="rId14"/>
+    <p:sldId id="272" r:id="rId15"/>
+    <p:sldId id="270" r:id="rId16"/>
+    <p:sldId id="268" r:id="rId17"/>
+    <p:sldId id="271" r:id="rId18"/>
+    <p:sldId id="269" r:id="rId19"/>
+    <p:sldId id="273" r:id="rId20"/>
   </p:sldIdLst>
   <p:sldSz cx="12192000" cy="6858000"/>
   <p:notesSz cx="6858000" cy="9144000"/>
@@ -341,7 +343,7 @@
           <a:p>
             <a:fld id="{E3B7E7B0-E39C-45C8-8D05-17A1D38088B6}" type="datetimeFigureOut">
               <a:rPr lang="sk-SK" smtClean="0"/>
-              <a:t>28. 4. 2020</a:t>
+              <a:t>1. 5. 2020</a:t>
             </a:fld>
             <a:endParaRPr lang="sk-SK"/>
           </a:p>
@@ -632,7 +634,7 @@
           <a:p>
             <a:fld id="{E3B7E7B0-E39C-45C8-8D05-17A1D38088B6}" type="datetimeFigureOut">
               <a:rPr lang="sk-SK" smtClean="0"/>
-              <a:t>28. 4. 2020</a:t>
+              <a:t>1. 5. 2020</a:t>
             </a:fld>
             <a:endParaRPr lang="sk-SK"/>
           </a:p>
@@ -891,7 +893,7 @@
           <a:p>
             <a:fld id="{E3B7E7B0-E39C-45C8-8D05-17A1D38088B6}" type="datetimeFigureOut">
               <a:rPr lang="sk-SK" smtClean="0"/>
-              <a:t>28. 4. 2020</a:t>
+              <a:t>1. 5. 2020</a:t>
             </a:fld>
             <a:endParaRPr lang="sk-SK"/>
           </a:p>
@@ -1360,7 +1362,7 @@
           <a:p>
             <a:fld id="{E3B7E7B0-E39C-45C8-8D05-17A1D38088B6}" type="datetimeFigureOut">
               <a:rPr lang="sk-SK" smtClean="0"/>
-              <a:t>28. 4. 2020</a:t>
+              <a:t>1. 5. 2020</a:t>
             </a:fld>
             <a:endParaRPr lang="sk-SK"/>
           </a:p>
@@ -1540,7 +1542,7 @@
           <a:p>
             <a:fld id="{E3B7E7B0-E39C-45C8-8D05-17A1D38088B6}" type="datetimeFigureOut">
               <a:rPr lang="sk-SK" smtClean="0"/>
-              <a:t>28. 4. 2020</a:t>
+              <a:t>1. 5. 2020</a:t>
             </a:fld>
             <a:endParaRPr lang="sk-SK"/>
           </a:p>
@@ -2116,7 +2118,7 @@
           <a:p>
             <a:fld id="{E3B7E7B0-E39C-45C8-8D05-17A1D38088B6}" type="datetimeFigureOut">
               <a:rPr lang="sk-SK" smtClean="0"/>
-              <a:t>28. 4. 2020</a:t>
+              <a:t>1. 5. 2020</a:t>
             </a:fld>
             <a:endParaRPr lang="sk-SK"/>
           </a:p>
@@ -2448,7 +2450,7 @@
           <a:p>
             <a:fld id="{E3B7E7B0-E39C-45C8-8D05-17A1D38088B6}" type="datetimeFigureOut">
               <a:rPr lang="sk-SK" smtClean="0"/>
-              <a:t>28. 4. 2020</a:t>
+              <a:t>1. 5. 2020</a:t>
             </a:fld>
             <a:endParaRPr lang="sk-SK"/>
           </a:p>
@@ -2623,7 +2625,7 @@
           <a:p>
             <a:fld id="{E3B7E7B0-E39C-45C8-8D05-17A1D38088B6}" type="datetimeFigureOut">
               <a:rPr lang="sk-SK" smtClean="0"/>
-              <a:t>28. 4. 2020</a:t>
+              <a:t>1. 5. 2020</a:t>
             </a:fld>
             <a:endParaRPr lang="sk-SK"/>
           </a:p>
@@ -2803,7 +2805,7 @@
           <a:p>
             <a:fld id="{E3B7E7B0-E39C-45C8-8D05-17A1D38088B6}" type="datetimeFigureOut">
               <a:rPr lang="sk-SK" smtClean="0"/>
-              <a:t>28. 4. 2020</a:t>
+              <a:t>1. 5. 2020</a:t>
             </a:fld>
             <a:endParaRPr lang="sk-SK"/>
           </a:p>
@@ -2973,7 +2975,7 @@
           <a:p>
             <a:fld id="{E3B7E7B0-E39C-45C8-8D05-17A1D38088B6}" type="datetimeFigureOut">
               <a:rPr lang="sk-SK" smtClean="0"/>
-              <a:t>28. 4. 2020</a:t>
+              <a:t>1. 5. 2020</a:t>
             </a:fld>
             <a:endParaRPr lang="sk-SK"/>
           </a:p>
@@ -3230,7 +3232,7 @@
           <a:p>
             <a:fld id="{E3B7E7B0-E39C-45C8-8D05-17A1D38088B6}" type="datetimeFigureOut">
               <a:rPr lang="sk-SK" smtClean="0"/>
-              <a:t>28. 4. 2020</a:t>
+              <a:t>1. 5. 2020</a:t>
             </a:fld>
             <a:endParaRPr lang="sk-SK"/>
           </a:p>
@@ -3522,7 +3524,7 @@
           <a:p>
             <a:fld id="{E3B7E7B0-E39C-45C8-8D05-17A1D38088B6}" type="datetimeFigureOut">
               <a:rPr lang="sk-SK" smtClean="0"/>
-              <a:t>28. 4. 2020</a:t>
+              <a:t>1. 5. 2020</a:t>
             </a:fld>
             <a:endParaRPr lang="sk-SK"/>
           </a:p>
@@ -3952,7 +3954,7 @@
           <a:p>
             <a:fld id="{E3B7E7B0-E39C-45C8-8D05-17A1D38088B6}" type="datetimeFigureOut">
               <a:rPr lang="sk-SK" smtClean="0"/>
-              <a:t>28. 4. 2020</a:t>
+              <a:t>1. 5. 2020</a:t>
             </a:fld>
             <a:endParaRPr lang="sk-SK"/>
           </a:p>
@@ -4070,7 +4072,7 @@
           <a:p>
             <a:fld id="{E3B7E7B0-E39C-45C8-8D05-17A1D38088B6}" type="datetimeFigureOut">
               <a:rPr lang="sk-SK" smtClean="0"/>
-              <a:t>28. 4. 2020</a:t>
+              <a:t>1. 5. 2020</a:t>
             </a:fld>
             <a:endParaRPr lang="sk-SK"/>
           </a:p>
@@ -4165,7 +4167,7 @@
           <a:p>
             <a:fld id="{E3B7E7B0-E39C-45C8-8D05-17A1D38088B6}" type="datetimeFigureOut">
               <a:rPr lang="sk-SK" smtClean="0"/>
-              <a:t>28. 4. 2020</a:t>
+              <a:t>1. 5. 2020</a:t>
             </a:fld>
             <a:endParaRPr lang="sk-SK"/>
           </a:p>
@@ -4448,7 +4450,7 @@
           <a:p>
             <a:fld id="{E3B7E7B0-E39C-45C8-8D05-17A1D38088B6}" type="datetimeFigureOut">
               <a:rPr lang="sk-SK" smtClean="0"/>
-              <a:t>28. 4. 2020</a:t>
+              <a:t>1. 5. 2020</a:t>
             </a:fld>
             <a:endParaRPr lang="sk-SK"/>
           </a:p>
@@ -4739,7 +4741,7 @@
           <a:p>
             <a:fld id="{E3B7E7B0-E39C-45C8-8D05-17A1D38088B6}" type="datetimeFigureOut">
               <a:rPr lang="sk-SK" smtClean="0"/>
-              <a:t>28. 4. 2020</a:t>
+              <a:t>1. 5. 2020</a:t>
             </a:fld>
             <a:endParaRPr lang="sk-SK"/>
           </a:p>
@@ -4970,7 +4972,7 @@
           <a:p>
             <a:fld id="{E3B7E7B0-E39C-45C8-8D05-17A1D38088B6}" type="datetimeFigureOut">
               <a:rPr lang="sk-SK" smtClean="0"/>
-              <a:t>28. 4. 2020</a:t>
+              <a:t>1. 5. 2020</a:t>
             </a:fld>
             <a:endParaRPr lang="sk-SK"/>
           </a:p>
@@ -5905,6 +5907,491 @@
       </p:grpSpPr>
       <p:sp>
         <p:nvSpPr>
+          <p:cNvPr id="3" name="Zástupný objekt pre obsah 2">
+            <a:extLst>
+              <a:ext uri="{FF2B5EF4-FFF2-40B4-BE49-F238E27FC236}">
+                <a16:creationId xmlns:a16="http://schemas.microsoft.com/office/drawing/2014/main" id="{6ED9B8A4-6811-41A8-A575-F133C8D04129}"/>
+              </a:ext>
+            </a:extLst>
+          </p:cNvPr>
+          <p:cNvSpPr>
+            <a:spLocks noGrp="1"/>
+          </p:cNvSpPr>
+          <p:nvPr>
+            <p:ph idx="1"/>
+          </p:nvPr>
+        </p:nvSpPr>
+        <p:spPr>
+          <a:xfrm>
+            <a:off x="6770646" y="1385234"/>
+            <a:ext cx="3701610" cy="3124201"/>
+          </a:xfrm>
+        </p:spPr>
+        <p:txBody>
+          <a:bodyPr/>
+          <a:lstStyle/>
+          <a:p>
+            <a:r>
+              <a:rPr lang="en-US" b="1" dirty="0" err="1"/>
+              <a:t>Softmax</a:t>
+            </a:r>
+            <a:r>
+              <a:rPr lang="en-US" dirty="0"/>
+              <a:t> - </a:t>
+            </a:r>
+            <a:r>
+              <a:rPr lang="pl-PL" dirty="0"/>
+              <a:t>normalizuje naše hodnoty na štandardný rozsah (0 až 1)</a:t>
+            </a:r>
+            <a:endParaRPr lang="en-US" dirty="0"/>
+          </a:p>
+          <a:p>
+            <a:endParaRPr lang="sk-SK" dirty="0"/>
+          </a:p>
+        </p:txBody>
+      </p:sp>
+      <p:pic>
+        <p:nvPicPr>
+          <p:cNvPr id="9" name="Obrázok 8">
+            <a:extLst>
+              <a:ext uri="{FF2B5EF4-FFF2-40B4-BE49-F238E27FC236}">
+                <a16:creationId xmlns:a16="http://schemas.microsoft.com/office/drawing/2014/main" id="{03FE78DD-BCBE-47A4-A0D2-57F548A0807A}"/>
+              </a:ext>
+            </a:extLst>
+          </p:cNvPr>
+          <p:cNvPicPr>
+            <a:picLocks noChangeAspect="1"/>
+          </p:cNvPicPr>
+          <p:nvPr/>
+        </p:nvPicPr>
+        <p:blipFill>
+          <a:blip r:embed="rId2">
+            <a:extLst>
+              <a:ext uri="{28A0092B-C50C-407E-A947-70E740481C1C}">
+                <a14:useLocalDpi xmlns:a14="http://schemas.microsoft.com/office/drawing/2010/main" val="0"/>
+              </a:ext>
+            </a:extLst>
+          </a:blip>
+          <a:stretch>
+            <a:fillRect/>
+          </a:stretch>
+        </p:blipFill>
+        <p:spPr>
+          <a:xfrm>
+            <a:off x="926422" y="1385234"/>
+            <a:ext cx="5169578" cy="2540814"/>
+          </a:xfrm>
+          <a:prstGeom prst="rect">
+            <a:avLst/>
+          </a:prstGeom>
+        </p:spPr>
+      </p:pic>
+    </p:spTree>
+    <p:extLst>
+      <p:ext uri="{BB962C8B-B14F-4D97-AF65-F5344CB8AC3E}">
+        <p14:creationId xmlns:p14="http://schemas.microsoft.com/office/powerpoint/2010/main" val="2167880227"/>
+      </p:ext>
+    </p:extLst>
+  </p:cSld>
+  <p:clrMapOvr>
+    <a:masterClrMapping/>
+  </p:clrMapOvr>
+</p:sld>
+</file>
+
+<file path=ppt/slides/slide11.xml><?xml version="1.0" encoding="utf-8"?>
+<p:sld xmlns:a="http://schemas.openxmlformats.org/drawingml/2006/main" xmlns:r="http://schemas.openxmlformats.org/officeDocument/2006/relationships" xmlns:p="http://schemas.openxmlformats.org/presentationml/2006/main">
+  <p:cSld>
+    <p:spTree>
+      <p:nvGrpSpPr>
+        <p:cNvPr id="1" name=""/>
+        <p:cNvGrpSpPr/>
+        <p:nvPr/>
+      </p:nvGrpSpPr>
+      <p:grpSpPr>
+        <a:xfrm>
+          <a:off x="0" y="0"/>
+          <a:ext cx="0" cy="0"/>
+          <a:chOff x="0" y="0"/>
+          <a:chExt cx="0" cy="0"/>
+        </a:xfrm>
+      </p:grpSpPr>
+      <p:sp>
+        <p:nvSpPr>
+          <p:cNvPr id="3" name="Zástupný objekt pre obsah 2">
+            <a:extLst>
+              <a:ext uri="{FF2B5EF4-FFF2-40B4-BE49-F238E27FC236}">
+                <a16:creationId xmlns:a16="http://schemas.microsoft.com/office/drawing/2014/main" id="{04E20385-5EE4-4D94-8D38-EB83B332C05A}"/>
+              </a:ext>
+            </a:extLst>
+          </p:cNvPr>
+          <p:cNvSpPr>
+            <a:spLocks noGrp="1"/>
+          </p:cNvSpPr>
+          <p:nvPr>
+            <p:ph idx="1"/>
+          </p:nvPr>
+        </p:nvSpPr>
+        <p:spPr>
+          <a:xfrm>
+            <a:off x="536897" y="1693876"/>
+            <a:ext cx="7155808" cy="4933427"/>
+          </a:xfrm>
+        </p:spPr>
+        <p:txBody>
+          <a:bodyPr>
+            <a:normAutofit fontScale="77500" lnSpcReduction="20000"/>
+          </a:bodyPr>
+          <a:lstStyle/>
+          <a:p>
+            <a:pPr marL="0" indent="0">
+              <a:buNone/>
+            </a:pPr>
+            <a:r>
+              <a:rPr lang="sk-SK" b="1" dirty="0"/>
+              <a:t>Najprv musíme vedieť ako funguje lineárna regresia</a:t>
+            </a:r>
+            <a:r>
+              <a:rPr lang="en-US" b="1" dirty="0"/>
+              <a:t>:</a:t>
+            </a:r>
+            <a:endParaRPr lang="sk-SK" b="1" dirty="0"/>
+          </a:p>
+          <a:p>
+            <a:r>
+              <a:rPr lang="sk-SK" dirty="0">
+                <a:effectLst/>
+              </a:rPr>
+              <a:t>Lineárna regresia hľadá najlepšiu regresnú priamku pomocou techniky minimalizácie súčtu chýb na druhú</a:t>
+            </a:r>
+          </a:p>
+          <a:p>
+            <a:r>
+              <a:rPr lang="sk-SK" dirty="0">
+                <a:effectLst/>
+              </a:rPr>
+              <a:t>V tomto kontexte je chyba technický termín, ktorý označuje rozdiel medzi skutočnou hodnotou dátového bodu a hodnotou predpovedanou regresnou priamkou</a:t>
+            </a:r>
+          </a:p>
+          <a:p>
+            <a:r>
+              <a:rPr lang="sk-SK" dirty="0">
+                <a:effectLst/>
+              </a:rPr>
+              <a:t>Súčet chýb na druhú sa označuje aj ako r</a:t>
+            </a:r>
+            <a:r>
+              <a:rPr lang="sk-SK" baseline="30000" dirty="0">
+                <a:effectLst/>
+              </a:rPr>
+              <a:t>2</a:t>
+            </a:r>
+          </a:p>
+          <a:p>
+            <a:r>
+              <a:rPr lang="sk-SK" dirty="0">
+                <a:effectLst/>
+              </a:rPr>
+              <a:t>Cieľom funkcie lineárnej regresie je čo najviac minimalizovať r</a:t>
+            </a:r>
+            <a:r>
+              <a:rPr lang="sk-SK" baseline="30000" dirty="0">
+                <a:effectLst/>
+              </a:rPr>
+              <a:t>2</a:t>
+            </a:r>
+            <a:r>
+              <a:rPr lang="sk-SK" dirty="0">
+                <a:effectLst/>
+              </a:rPr>
+              <a:t>, teda čo najviac priblížiť jeho hodnotu k nule</a:t>
+            </a:r>
+          </a:p>
+          <a:p>
+            <a:r>
+              <a:rPr lang="sk-SK" dirty="0">
+                <a:effectLst/>
+              </a:rPr>
+              <a:t>Pomocou hodnoty r</a:t>
+            </a:r>
+            <a:r>
+              <a:rPr lang="sk-SK" baseline="30000" dirty="0">
+                <a:effectLst/>
+              </a:rPr>
+              <a:t>2</a:t>
+            </a:r>
+            <a:r>
+              <a:rPr lang="sk-SK" dirty="0">
+                <a:effectLst/>
+              </a:rPr>
+              <a:t> sa taktiež určuje úspešnosť lineárnej regresie, čo sa pri predchádzajúcich klasifikačných algoritmoch robilo pomocou techniky krížovej validácie</a:t>
+            </a:r>
+          </a:p>
+          <a:p>
+            <a:pPr marL="0" indent="0">
+              <a:buNone/>
+            </a:pPr>
+            <a:r>
+              <a:rPr lang="sk-SK" b="1" dirty="0">
+                <a:effectLst/>
+              </a:rPr>
+              <a:t>Napríklad – </a:t>
+            </a:r>
+            <a:r>
+              <a:rPr lang="sk-SK" b="1" dirty="0" err="1">
+                <a:effectLst/>
+              </a:rPr>
+              <a:t>logits</a:t>
+            </a:r>
+            <a:r>
+              <a:rPr lang="en-US" b="1" dirty="0">
+                <a:effectLst/>
+              </a:rPr>
+              <a:t>(</a:t>
+            </a:r>
+            <a:r>
+              <a:rPr lang="sk-SK" b="1" dirty="0">
+                <a:effectLst/>
+              </a:rPr>
+              <a:t>červená čiara</a:t>
+            </a:r>
+            <a:r>
+              <a:rPr lang="en-US" b="1" dirty="0">
+                <a:effectLst/>
+              </a:rPr>
+              <a:t>)</a:t>
+            </a:r>
+            <a:r>
+              <a:rPr lang="sk-SK" b="1" dirty="0">
+                <a:effectLst/>
+              </a:rPr>
+              <a:t> a </a:t>
+            </a:r>
+            <a:r>
+              <a:rPr lang="sk-SK" b="1" dirty="0" err="1">
+                <a:effectLst/>
+              </a:rPr>
+              <a:t>dataset</a:t>
+            </a:r>
+            <a:r>
+              <a:rPr lang="en-US" b="1" dirty="0">
+                <a:effectLst/>
+              </a:rPr>
+              <a:t>(</a:t>
+            </a:r>
+            <a:r>
+              <a:rPr lang="sk-SK" b="1" dirty="0">
+                <a:effectLst/>
+              </a:rPr>
+              <a:t>m</a:t>
+            </a:r>
+            <a:r>
+              <a:rPr lang="en-US" b="1" dirty="0" err="1">
+                <a:effectLst/>
+              </a:rPr>
+              <a:t>odr</a:t>
+            </a:r>
+            <a:r>
+              <a:rPr lang="sk-SK" b="1" dirty="0">
+                <a:effectLst/>
+              </a:rPr>
+              <a:t>é bodky</a:t>
+            </a:r>
+            <a:r>
+              <a:rPr lang="en-US" b="1" dirty="0">
+                <a:effectLst/>
+              </a:rPr>
+              <a:t>)</a:t>
+            </a:r>
+            <a:endParaRPr lang="sk-SK" b="1" dirty="0">
+              <a:effectLst/>
+            </a:endParaRPr>
+          </a:p>
+          <a:p>
+            <a:r>
+              <a:rPr lang="sk-SK" dirty="0">
+                <a:effectLst/>
+              </a:rPr>
+              <a:t>Na zistenie chýb</a:t>
+            </a:r>
+            <a:r>
+              <a:rPr lang="en-US" dirty="0">
+                <a:effectLst/>
+              </a:rPr>
+              <a:t>(cost/errors)</a:t>
+            </a:r>
+            <a:r>
+              <a:rPr lang="sk-SK" dirty="0">
+                <a:effectLst/>
+              </a:rPr>
+              <a:t> musí</a:t>
+            </a:r>
+            <a:r>
+              <a:rPr lang="en-US" dirty="0">
+                <a:effectLst/>
+              </a:rPr>
+              <a:t>m</a:t>
+            </a:r>
+            <a:r>
+              <a:rPr lang="sk-SK" dirty="0">
+                <a:effectLst/>
+              </a:rPr>
+              <a:t>e odčítať celú hodnotu modrých bodov červenou čiarou</a:t>
+            </a:r>
+            <a:endParaRPr lang="en-US" dirty="0">
+              <a:effectLst/>
+            </a:endParaRPr>
+          </a:p>
+          <a:p>
+            <a:r>
+              <a:rPr lang="sk-SK" dirty="0">
+                <a:effectLst/>
+              </a:rPr>
+              <a:t>Ďalej </a:t>
+            </a:r>
+            <a:r>
+              <a:rPr lang="en-US" dirty="0">
+                <a:effectLst/>
+              </a:rPr>
+              <a:t>zo </a:t>
+            </a:r>
+            <a:r>
+              <a:rPr lang="sk-SK" dirty="0">
+                <a:effectLst/>
+              </a:rPr>
+              <a:t>všetkých nájdených vzdialeností spravíme priemer</a:t>
+            </a:r>
+            <a:endParaRPr lang="en-US" dirty="0">
+              <a:effectLst/>
+            </a:endParaRPr>
+          </a:p>
+          <a:p>
+            <a:r>
+              <a:rPr lang="sk-SK" dirty="0">
+                <a:effectLst/>
+              </a:rPr>
+              <a:t>Pre dobrú pred</a:t>
+            </a:r>
+            <a:r>
+              <a:rPr lang="en-US" dirty="0" err="1">
+                <a:effectLst/>
+              </a:rPr>
+              <a:t>ikciu</a:t>
+            </a:r>
+            <a:r>
+              <a:rPr lang="sk-SK" dirty="0">
+                <a:effectLst/>
+              </a:rPr>
+              <a:t> musí byť táto priemerná vzdialenosť červenej čiary a modrej bodky minimálna hodnota</a:t>
+            </a:r>
+          </a:p>
+          <a:p>
+            <a:endParaRPr lang="sk-SK" dirty="0"/>
+          </a:p>
+        </p:txBody>
+      </p:sp>
+      <p:sp>
+        <p:nvSpPr>
+          <p:cNvPr id="4" name="Nadpis 1">
+            <a:extLst>
+              <a:ext uri="{FF2B5EF4-FFF2-40B4-BE49-F238E27FC236}">
+                <a16:creationId xmlns:a16="http://schemas.microsoft.com/office/drawing/2014/main" id="{88C51A8B-AE20-4F4E-A881-F92F3666668C}"/>
+              </a:ext>
+            </a:extLst>
+          </p:cNvPr>
+          <p:cNvSpPr>
+            <a:spLocks noGrp="1"/>
+          </p:cNvSpPr>
+          <p:nvPr>
+            <p:ph type="title"/>
+          </p:nvPr>
+        </p:nvSpPr>
+        <p:spPr>
+          <a:xfrm>
+            <a:off x="536897" y="483765"/>
+            <a:ext cx="9905998" cy="1030447"/>
+          </a:xfrm>
+        </p:spPr>
+        <p:txBody>
+          <a:bodyPr/>
+          <a:lstStyle/>
+          <a:p>
+            <a:r>
+              <a:rPr lang="en-US" dirty="0"/>
+              <a:t>CROSS ENTROPY</a:t>
+            </a:r>
+            <a:endParaRPr lang="sk-SK" dirty="0"/>
+          </a:p>
+        </p:txBody>
+      </p:sp>
+      <p:pic>
+        <p:nvPicPr>
+          <p:cNvPr id="6" name="Obrázok 5">
+            <a:extLst>
+              <a:ext uri="{FF2B5EF4-FFF2-40B4-BE49-F238E27FC236}">
+                <a16:creationId xmlns:a16="http://schemas.microsoft.com/office/drawing/2014/main" id="{E83F8C18-7D74-404B-963D-85879013DDB5}"/>
+              </a:ext>
+            </a:extLst>
+          </p:cNvPr>
+          <p:cNvPicPr>
+            <a:picLocks noChangeAspect="1"/>
+          </p:cNvPicPr>
+          <p:nvPr/>
+        </p:nvPicPr>
+        <p:blipFill>
+          <a:blip r:embed="rId2">
+            <a:extLst>
+              <a:ext uri="{28A0092B-C50C-407E-A947-70E740481C1C}">
+                <a14:useLocalDpi xmlns:a14="http://schemas.microsoft.com/office/drawing/2010/main" val="0"/>
+              </a:ext>
+            </a:extLst>
+          </a:blip>
+          <a:stretch>
+            <a:fillRect/>
+          </a:stretch>
+        </p:blipFill>
+        <p:spPr>
+          <a:xfrm>
+            <a:off x="7784984" y="2108606"/>
+            <a:ext cx="4116350" cy="2640788"/>
+          </a:xfrm>
+          <a:prstGeom prst="rect">
+            <a:avLst/>
+          </a:prstGeom>
+        </p:spPr>
+      </p:pic>
+    </p:spTree>
+    <p:extLst>
+      <p:ext uri="{BB962C8B-B14F-4D97-AF65-F5344CB8AC3E}">
+        <p14:creationId xmlns:p14="http://schemas.microsoft.com/office/powerpoint/2010/main" val="2462912733"/>
+      </p:ext>
+    </p:extLst>
+  </p:cSld>
+  <p:clrMapOvr>
+    <a:masterClrMapping/>
+  </p:clrMapOvr>
+</p:sld>
+</file>
+
+<file path=ppt/slides/slide12.xml><?xml version="1.0" encoding="utf-8"?>
+<p:sld xmlns:a="http://schemas.openxmlformats.org/drawingml/2006/main" xmlns:r="http://schemas.openxmlformats.org/officeDocument/2006/relationships" xmlns:p="http://schemas.openxmlformats.org/presentationml/2006/main">
+  <p:cSld>
+    <p:spTree>
+      <p:nvGrpSpPr>
+        <p:cNvPr id="1" name=""/>
+        <p:cNvGrpSpPr/>
+        <p:nvPr/>
+      </p:nvGrpSpPr>
+      <p:grpSpPr>
+        <a:xfrm>
+          <a:off x="0" y="0"/>
+          <a:ext cx="0" cy="0"/>
+          <a:chOff x="0" y="0"/>
+          <a:chExt cx="0" cy="0"/>
+        </a:xfrm>
+      </p:grpSpPr>
+      <p:sp>
+        <p:nvSpPr>
           <p:cNvPr id="2" name="Nadpis 1">
             <a:extLst>
               <a:ext uri="{FF2B5EF4-FFF2-40B4-BE49-F238E27FC236}">
@@ -5988,7 +6475,7 @@
         </p:nvSpPr>
         <p:spPr>
           <a:xfrm>
-            <a:off x="1141413" y="2918669"/>
+            <a:off x="1141413" y="3038244"/>
             <a:ext cx="9905998" cy="3124201"/>
           </a:xfrm>
           <a:prstGeom prst="rect">
@@ -6478,7 +6965,7 @@
 </p:sld>
 </file>
 
-<file path=ppt/slides/slide11.xml><?xml version="1.0" encoding="utf-8"?>
+<file path=ppt/slides/slide13.xml><?xml version="1.0" encoding="utf-8"?>
 <p:sld xmlns:a="http://schemas.openxmlformats.org/drawingml/2006/main" xmlns:r="http://schemas.openxmlformats.org/officeDocument/2006/relationships" xmlns:p="http://schemas.openxmlformats.org/presentationml/2006/main">
   <p:cSld>
     <p:spTree>
@@ -7184,7 +7671,7 @@
 </p:sld>
 </file>
 
-<file path=ppt/slides/slide12.xml><?xml version="1.0" encoding="utf-8"?>
+<file path=ppt/slides/slide14.xml><?xml version="1.0" encoding="utf-8"?>
 <p:sld xmlns:a="http://schemas.openxmlformats.org/drawingml/2006/main" xmlns:r="http://schemas.openxmlformats.org/officeDocument/2006/relationships" xmlns:p="http://schemas.openxmlformats.org/presentationml/2006/main">
   <p:cSld>
     <p:spTree>
@@ -7260,7 +7747,7 @@
         </p:blipFill>
         <p:spPr>
           <a:xfrm>
-            <a:off x="908651" y="3285039"/>
+            <a:off x="907063" y="2616329"/>
             <a:ext cx="10374697" cy="1625342"/>
           </a:xfrm>
         </p:spPr>
@@ -7278,7 +7765,7 @@
 </p:sld>
 </file>
 
-<file path=ppt/slides/slide13.xml><?xml version="1.0" encoding="utf-8"?>
+<file path=ppt/slides/slide15.xml><?xml version="1.0" encoding="utf-8"?>
 <p:sld xmlns:a="http://schemas.openxmlformats.org/drawingml/2006/main" xmlns:r="http://schemas.openxmlformats.org/officeDocument/2006/relationships" xmlns:p="http://schemas.openxmlformats.org/presentationml/2006/main">
   <p:cSld>
     <p:spTree>
@@ -7359,7 +7846,7 @@
         </p:blipFill>
         <p:spPr>
           <a:xfrm>
-            <a:off x="1849921" y="1699120"/>
+            <a:off x="1849921" y="1648786"/>
             <a:ext cx="8492158" cy="4737650"/>
           </a:xfrm>
         </p:spPr>
@@ -7377,7 +7864,7 @@
 </p:sld>
 </file>
 
-<file path=ppt/slides/slide14.xml><?xml version="1.0" encoding="utf-8"?>
+<file path=ppt/slides/slide16.xml><?xml version="1.0" encoding="utf-8"?>
 <p:sld xmlns:a="http://schemas.openxmlformats.org/drawingml/2006/main" xmlns:r="http://schemas.openxmlformats.org/officeDocument/2006/relationships" xmlns:p="http://schemas.openxmlformats.org/presentationml/2006/main">
   <p:cSld>
     <p:spTree>
@@ -7445,7 +7932,7 @@
         </p:nvSpPr>
         <p:spPr>
           <a:xfrm>
-            <a:off x="1293813" y="762000"/>
+            <a:off x="1378212" y="242702"/>
             <a:ext cx="9905998" cy="1905000"/>
           </a:xfrm>
           <a:prstGeom prst="rect">
@@ -7712,7 +8199,7 @@
 </p:sld>
 </file>
 
-<file path=ppt/slides/slide15.xml><?xml version="1.0" encoding="utf-8"?>
+<file path=ppt/slides/slide17.xml><?xml version="1.0" encoding="utf-8"?>
 <p:sld xmlns:a="http://schemas.openxmlformats.org/drawingml/2006/main" xmlns:r="http://schemas.openxmlformats.org/officeDocument/2006/relationships" xmlns:p="http://schemas.openxmlformats.org/presentationml/2006/main">
   <p:cSld>
     <p:spTree>
@@ -7796,7 +8283,7 @@
         </p:blipFill>
         <p:spPr>
           <a:xfrm>
-            <a:off x="335334" y="1278608"/>
+            <a:off x="1214090" y="1278608"/>
             <a:ext cx="3370177" cy="1565260"/>
           </a:xfrm>
         </p:spPr>
@@ -8130,7 +8617,7 @@
 </p:sld>
 </file>
 
-<file path=ppt/slides/slide16.xml><?xml version="1.0" encoding="utf-8"?>
+<file path=ppt/slides/slide18.xml><?xml version="1.0" encoding="utf-8"?>
 <p:sld xmlns:a="http://schemas.openxmlformats.org/drawingml/2006/main" xmlns:r="http://schemas.openxmlformats.org/officeDocument/2006/relationships" xmlns:p="http://schemas.openxmlformats.org/presentationml/2006/main">
   <p:cSld>
     <p:spTree>
@@ -8204,11 +8691,63 @@
         </p:spPr>
         <p:txBody>
           <a:bodyPr>
-            <a:normAutofit fontScale="77500" lnSpcReduction="20000"/>
+            <a:normAutofit fontScale="70000" lnSpcReduction="20000"/>
           </a:bodyPr>
           <a:lstStyle/>
           <a:p>
             <a:r>
+              <a:rPr lang="en-US" dirty="0">
+                <a:hlinkClick r:id="rId2"/>
+              </a:rPr>
+              <a:t>https://www.tensorflow.org/about</a:t>
+            </a:r>
+          </a:p>
+          <a:p>
+            <a:r>
+              <a:rPr lang="sk-SK" dirty="0">
+                <a:hlinkClick r:id="rId3"/>
+              </a:rPr>
+              <a:t>https://www.tensorflow.org/api_docs/python/tf/reshape</a:t>
+            </a:r>
+            <a:endParaRPr lang="en-US" dirty="0"/>
+          </a:p>
+          <a:p>
+            <a:r>
+              <a:rPr lang="sk-SK" dirty="0">
+                <a:hlinkClick r:id="rId4"/>
+              </a:rPr>
+              <a:t>https://www.tensorflow.org/api_docs/python/tf/one_hot</a:t>
+            </a:r>
+            <a:endParaRPr lang="sk-SK" dirty="0"/>
+          </a:p>
+          <a:p>
+            <a:r>
+              <a:rPr lang="sk-SK" dirty="0">
+                <a:hlinkClick r:id="rId5"/>
+              </a:rPr>
+              <a:t>https://www.tensorflow.org/api_docs/python/tf/compat/v1/train/GradientDescentOptimizer</a:t>
+            </a:r>
+            <a:endParaRPr lang="sk-SK" dirty="0"/>
+          </a:p>
+          <a:p>
+            <a:r>
+              <a:rPr lang="sk-SK" dirty="0">
+                <a:hlinkClick r:id="rId6"/>
+              </a:rPr>
+              <a:t>https://www.tensorflow.org/api_docs/python/tf/compat/v1/train/AdamOptimizer</a:t>
+            </a:r>
+            <a:endParaRPr lang="sk-SK" dirty="0"/>
+          </a:p>
+          <a:p>
+            <a:pPr marL="0" indent="0">
+              <a:buNone/>
+            </a:pPr>
+            <a:endParaRPr lang="en-US" dirty="0">
+              <a:hlinkClick r:id="rId2"/>
+            </a:endParaRPr>
+          </a:p>
+          <a:p>
+            <a:r>
               <a:rPr lang="sk-SK" dirty="0">
                 <a:hlinkClick r:id="rId2"/>
               </a:rPr>
@@ -8219,45 +8758,9 @@
           <a:p>
             <a:r>
               <a:rPr lang="sk-SK" dirty="0">
-                <a:hlinkClick r:id="rId3"/>
+                <a:hlinkClick r:id="rId7"/>
               </a:rPr>
               <a:t>https://www.javatpoint.com/single-layer-perceptron-in-tensorflow</a:t>
-            </a:r>
-            <a:endParaRPr lang="sk-SK" dirty="0"/>
-          </a:p>
-          <a:p>
-            <a:r>
-              <a:rPr lang="sk-SK" dirty="0">
-                <a:hlinkClick r:id="rId4"/>
-              </a:rPr>
-              <a:t>https://nasirml.wordpress.com/2017/11/19/single-layer-perceptron-in-tensorflow/</a:t>
-            </a:r>
-            <a:endParaRPr lang="sk-SK" dirty="0"/>
-          </a:p>
-          <a:p>
-            <a:r>
-              <a:rPr lang="sk-SK" dirty="0">
-                <a:hlinkClick r:id="rId5"/>
-              </a:rPr>
-              <a:t>https://medium.com/@jaschaephraim/elementary-neural-networks-with-tensorflow-c2593ad3d60b</a:t>
-            </a:r>
-            <a:endParaRPr lang="en-US" dirty="0"/>
-          </a:p>
-          <a:p>
-            <a:r>
-              <a:rPr lang="sk-SK" dirty="0">
-                <a:hlinkClick r:id="rId6"/>
-              </a:rPr>
-              <a:t>https://www.tensorflow.org/api_docs/python/tf/reshape</a:t>
-            </a:r>
-            <a:endParaRPr lang="en-US" dirty="0"/>
-          </a:p>
-          <a:p>
-            <a:r>
-              <a:rPr lang="sk-SK" dirty="0">
-                <a:hlinkClick r:id="rId7"/>
-              </a:rPr>
-              <a:t>https://www.tensorflow.org/api_docs/python/tf/one_hot</a:t>
             </a:r>
             <a:endParaRPr lang="sk-SK" dirty="0"/>
           </a:p>
@@ -8266,7 +8769,7 @@
               <a:rPr lang="sk-SK" dirty="0">
                 <a:hlinkClick r:id="rId8"/>
               </a:rPr>
-              <a:t>https://www.tensorflow.org/api_docs/python/tf/compat/v1/train/GradientDescentOptimizer</a:t>
+              <a:t>https://nasirml.wordpress.com/2017/11/19/single-layer-perceptron-in-tensorflow/</a:t>
             </a:r>
             <a:endParaRPr lang="sk-SK" dirty="0"/>
           </a:p>
@@ -8275,9 +8778,9 @@
               <a:rPr lang="sk-SK" dirty="0">
                 <a:hlinkClick r:id="rId9"/>
               </a:rPr>
-              <a:t>https://www.tensorflow.org/api_docs/python/tf/compat/v1/train/AdamOptimizer</a:t>
-            </a:r>
-            <a:endParaRPr lang="sk-SK" dirty="0"/>
+              <a:t>https://medium.com/@jaschaephraim/elementary-neural-networks-with-tensorflow-c2593ad3d60b</a:t>
+            </a:r>
+            <a:endParaRPr lang="en-US" dirty="0"/>
           </a:p>
           <a:p>
             <a:r>
@@ -8342,7 +8845,7 @@
 </p:sld>
 </file>
 
-<file path=ppt/slides/slide17.xml><?xml version="1.0" encoding="utf-8"?>
+<file path=ppt/slides/slide19.xml><?xml version="1.0" encoding="utf-8"?>
 <p:sld xmlns:a="http://schemas.openxmlformats.org/drawingml/2006/main" xmlns:r="http://schemas.openxmlformats.org/officeDocument/2006/relationships" xmlns:p="http://schemas.openxmlformats.org/presentationml/2006/main">
   <p:cSld>
     <p:spTree>
@@ -8439,6 +8942,219 @@
           <p:cNvPr id="2" name="Nadpis 1">
             <a:extLst>
               <a:ext uri="{FF2B5EF4-FFF2-40B4-BE49-F238E27FC236}">
+                <a16:creationId xmlns:a16="http://schemas.microsoft.com/office/drawing/2014/main" id="{E395920D-E01A-4876-8C2B-14CB114CB2C6}"/>
+              </a:ext>
+            </a:extLst>
+          </p:cNvPr>
+          <p:cNvSpPr>
+            <a:spLocks noGrp="1"/>
+          </p:cNvSpPr>
+          <p:nvPr>
+            <p:ph type="title"/>
+          </p:nvPr>
+        </p:nvSpPr>
+        <p:spPr/>
+        <p:txBody>
+          <a:bodyPr/>
+          <a:lstStyle/>
+          <a:p>
+            <a:r>
+              <a:rPr lang="sk-SK" dirty="0"/>
+              <a:t>Úvod do problematiky</a:t>
+            </a:r>
+          </a:p>
+        </p:txBody>
+      </p:sp>
+      <p:sp>
+        <p:nvSpPr>
+          <p:cNvPr id="3" name="Zástupný objekt pre obsah 2">
+            <a:extLst>
+              <a:ext uri="{FF2B5EF4-FFF2-40B4-BE49-F238E27FC236}">
+                <a16:creationId xmlns:a16="http://schemas.microsoft.com/office/drawing/2014/main" id="{0CC745A8-9427-4EB7-A8D4-CB5D4313B89B}"/>
+              </a:ext>
+            </a:extLst>
+          </p:cNvPr>
+          <p:cNvSpPr>
+            <a:spLocks noGrp="1"/>
+          </p:cNvSpPr>
+          <p:nvPr>
+            <p:ph idx="1"/>
+          </p:nvPr>
+        </p:nvSpPr>
+        <p:spPr/>
+        <p:txBody>
+          <a:bodyPr/>
+          <a:lstStyle/>
+          <a:p>
+            <a:r>
+              <a:rPr lang="sk-SK" dirty="0"/>
+              <a:t>Našou úlohou je naučiť NS klasifikovať zvieratá v ZOO</a:t>
+            </a:r>
+            <a:r>
+              <a:rPr lang="en-US" dirty="0"/>
+              <a:t> </a:t>
+            </a:r>
+            <a:r>
+              <a:rPr lang="sk-SK" dirty="0"/>
+              <a:t>o aký druh zvieraťa sa jedná na základe jeho vlastností </a:t>
+            </a:r>
+            <a:r>
+              <a:rPr lang="en-US" dirty="0"/>
+              <a:t>(</a:t>
+            </a:r>
+            <a:r>
+              <a:rPr lang="sk-SK" dirty="0" err="1"/>
+              <a:t>features</a:t>
+            </a:r>
+            <a:r>
+              <a:rPr lang="en-US" dirty="0"/>
+              <a:t>)</a:t>
+            </a:r>
+            <a:endParaRPr lang="sk-SK" dirty="0"/>
+          </a:p>
+          <a:p>
+            <a:r>
+              <a:rPr lang="sk-SK" dirty="0"/>
+              <a:t>Máme </a:t>
+            </a:r>
+            <a:r>
+              <a:rPr lang="en-US" dirty="0"/>
+              <a:t>16 </a:t>
+            </a:r>
+            <a:r>
+              <a:rPr lang="sk-SK" dirty="0"/>
+              <a:t>druhov vlastností</a:t>
+            </a:r>
+            <a:r>
+              <a:rPr lang="en-US" dirty="0"/>
+              <a:t> </a:t>
+            </a:r>
+            <a:r>
+              <a:rPr lang="sk-SK" dirty="0"/>
+              <a:t>a </a:t>
+            </a:r>
+            <a:r>
+              <a:rPr lang="en-US" dirty="0"/>
+              <a:t>7 </a:t>
+            </a:r>
+            <a:r>
+              <a:rPr lang="en-US" dirty="0" err="1"/>
+              <a:t>druhov</a:t>
+            </a:r>
+            <a:r>
+              <a:rPr lang="en-US" dirty="0"/>
+              <a:t> </a:t>
+            </a:r>
+            <a:r>
+              <a:rPr lang="en-US" dirty="0" err="1"/>
+              <a:t>zvierat</a:t>
+            </a:r>
+            <a:endParaRPr lang="sk-SK" dirty="0"/>
+          </a:p>
+          <a:p>
+            <a:r>
+              <a:rPr lang="sk-SK" dirty="0"/>
+              <a:t>Máme </a:t>
+            </a:r>
+            <a:r>
+              <a:rPr lang="en-US" dirty="0"/>
+              <a:t>100 </a:t>
+            </a:r>
+            <a:r>
+              <a:rPr lang="en-US" dirty="0" err="1"/>
+              <a:t>zvierat</a:t>
+            </a:r>
+            <a:r>
+              <a:rPr lang="en-US" dirty="0"/>
+              <a:t> (z</a:t>
+            </a:r>
+            <a:r>
+              <a:rPr lang="sk-SK" dirty="0" err="1"/>
+              <a:t>áz</a:t>
+            </a:r>
+            <a:r>
+              <a:rPr lang="en-US" dirty="0" err="1"/>
+              <a:t>namov</a:t>
+            </a:r>
+            <a:r>
+              <a:rPr lang="en-US" dirty="0"/>
+              <a:t>), </a:t>
+            </a:r>
+            <a:r>
+              <a:rPr lang="en-US" dirty="0" err="1"/>
+              <a:t>ktor</a:t>
+            </a:r>
+            <a:r>
+              <a:rPr lang="sk-SK" dirty="0"/>
+              <a:t>é sme si </a:t>
+            </a:r>
+            <a:r>
+              <a:rPr lang="sk-SK" dirty="0" err="1"/>
+              <a:t>ro</a:t>
+            </a:r>
+            <a:r>
+              <a:rPr lang="en-US" dirty="0" err="1"/>
+              <a:t>zdelili</a:t>
+            </a:r>
+            <a:r>
+              <a:rPr lang="en-US" dirty="0"/>
+              <a:t> </a:t>
+            </a:r>
+            <a:r>
+              <a:rPr lang="en-US" dirty="0" err="1"/>
+              <a:t>na</a:t>
+            </a:r>
+            <a:r>
+              <a:rPr lang="en-US" dirty="0"/>
+              <a:t> tr</a:t>
+            </a:r>
+            <a:r>
+              <a:rPr lang="sk-SK" dirty="0" err="1"/>
+              <a:t>énovacie</a:t>
+            </a:r>
+            <a:r>
+              <a:rPr lang="sk-SK" dirty="0"/>
+              <a:t> a testovacie dáta</a:t>
+            </a:r>
+            <a:endParaRPr lang="en-US" dirty="0"/>
+          </a:p>
+        </p:txBody>
+      </p:sp>
+    </p:spTree>
+    <p:extLst>
+      <p:ext uri="{BB962C8B-B14F-4D97-AF65-F5344CB8AC3E}">
+        <p14:creationId xmlns:p14="http://schemas.microsoft.com/office/powerpoint/2010/main" val="2800571173"/>
+      </p:ext>
+    </p:extLst>
+  </p:cSld>
+  <p:clrMapOvr>
+    <a:masterClrMapping/>
+  </p:clrMapOvr>
+</p:sld>
+</file>
+
+<file path=ppt/slides/slide3.xml><?xml version="1.0" encoding="utf-8"?>
+<p:sld xmlns:a="http://schemas.openxmlformats.org/drawingml/2006/main" xmlns:r="http://schemas.openxmlformats.org/officeDocument/2006/relationships" xmlns:p="http://schemas.openxmlformats.org/presentationml/2006/main">
+  <p:cSld>
+    <p:spTree>
+      <p:nvGrpSpPr>
+        <p:cNvPr id="1" name=""/>
+        <p:cNvGrpSpPr/>
+        <p:nvPr/>
+      </p:nvGrpSpPr>
+      <p:grpSpPr>
+        <a:xfrm>
+          <a:off x="0" y="0"/>
+          <a:ext cx="0" cy="0"/>
+          <a:chOff x="0" y="0"/>
+          <a:chExt cx="0" cy="0"/>
+        </a:xfrm>
+      </p:grpSpPr>
+      <p:sp>
+        <p:nvSpPr>
+          <p:cNvPr id="2" name="Nadpis 1">
+            <a:extLst>
+              <a:ext uri="{FF2B5EF4-FFF2-40B4-BE49-F238E27FC236}">
                 <a16:creationId xmlns:a16="http://schemas.microsoft.com/office/drawing/2014/main" id="{1D609BBA-8EBB-4768-B583-8D6E78C426CC}"/>
               </a:ext>
             </a:extLst>
@@ -8566,13 +9282,13 @@
         </p:nvSpPr>
         <p:spPr>
           <a:xfrm>
-            <a:off x="1141413" y="2667642"/>
-            <a:ext cx="4952999" cy="3124201"/>
+            <a:off x="1141413" y="2298526"/>
+            <a:ext cx="4952999" cy="4442028"/>
           </a:xfrm>
         </p:spPr>
         <p:txBody>
           <a:bodyPr>
-            <a:normAutofit fontScale="70000" lnSpcReduction="20000"/>
+            <a:normAutofit fontScale="62500" lnSpcReduction="20000"/>
           </a:bodyPr>
           <a:lstStyle/>
           <a:p>
@@ -8580,7 +9296,7 @@
               <a:buNone/>
             </a:pPr>
             <a:r>
-              <a:rPr lang="sk-SK" b="1" dirty="0">
+              <a:rPr lang="sk-SK" sz="2600" b="1" dirty="0">
                 <a:effectLst>
                   <a:glow rad="38100">
                     <a:schemeClr val="bg1">
@@ -8591,10 +9307,78 @@
                   </a:glow>
                 </a:effectLst>
               </a:rPr>
-              <a:t>Základná rovnica ANN</a:t>
-            </a:r>
-            <a:r>
-              <a:rPr lang="en-US" b="1" dirty="0">
+              <a:t>PERCEPTRÓN</a:t>
+            </a:r>
+            <a:r>
+              <a:rPr lang="sk-SK" sz="2600" dirty="0"/>
+              <a:t> je najjednoduchšia forma</a:t>
+            </a:r>
+            <a:r>
+              <a:rPr lang="en-US" sz="2600" dirty="0"/>
+              <a:t> </a:t>
+            </a:r>
+            <a:r>
+              <a:rPr lang="sk-SK" sz="2600" dirty="0"/>
+              <a:t>neurónovej siete, používaná na klasifikáciu vzorov, ktoré sú lineárne separovateľné, napr. </a:t>
+            </a:r>
+            <a:r>
+              <a:rPr lang="sk-SK" sz="2600" dirty="0" err="1"/>
+              <a:t>booleanovský</a:t>
+            </a:r>
+            <a:r>
+              <a:rPr lang="sk-SK" sz="2600" dirty="0"/>
+              <a:t> </a:t>
+            </a:r>
+            <a:r>
+              <a:rPr lang="sk-SK" sz="2600" b="1" dirty="0"/>
+              <a:t>AND, OR</a:t>
+            </a:r>
+            <a:r>
+              <a:rPr lang="sk-SK" sz="2600" dirty="0"/>
+              <a:t>,</a:t>
+            </a:r>
+            <a:r>
+              <a:rPr lang="en-US" sz="2600" dirty="0"/>
+              <a:t> </a:t>
+            </a:r>
+            <a:r>
+              <a:rPr lang="sk-SK" sz="2600" dirty="0"/>
+              <a:t>(problém XOR nie je lineárne separovateľný). </a:t>
+            </a:r>
+            <a:endParaRPr lang="en-US" sz="2600" b="1" dirty="0">
+              <a:effectLst>
+                <a:glow rad="38100">
+                  <a:schemeClr val="bg1">
+                    <a:lumMod val="50000"/>
+                    <a:lumOff val="50000"/>
+                    <a:alpha val="20000"/>
+                  </a:schemeClr>
+                </a:glow>
+              </a:effectLst>
+            </a:endParaRPr>
+          </a:p>
+          <a:p>
+            <a:pPr marL="0" indent="0">
+              <a:buNone/>
+            </a:pPr>
+            <a:endParaRPr lang="en-US" b="1" dirty="0">
+              <a:effectLst>
+                <a:glow rad="38100">
+                  <a:schemeClr val="bg1">
+                    <a:lumMod val="50000"/>
+                    <a:lumOff val="50000"/>
+                    <a:alpha val="20000"/>
+                  </a:schemeClr>
+                </a:glow>
+              </a:effectLst>
+            </a:endParaRPr>
+          </a:p>
+          <a:p>
+            <a:pPr marL="0" indent="0">
+              <a:buNone/>
+            </a:pPr>
+            <a:r>
+              <a:rPr lang="sk-SK" sz="2200" b="1" dirty="0">
                 <a:effectLst>
                   <a:glow rad="38100">
                     <a:schemeClr val="bg1">
@@ -8605,10 +9389,10 @@
                   </a:glow>
                 </a:effectLst>
               </a:rPr>
-              <a:t> (</a:t>
-            </a:r>
-            <a:r>
-              <a:rPr lang="sk-SK" b="1" dirty="0">
+              <a:t>ZÁKLADNÁ ROVNICA ANN</a:t>
+            </a:r>
+            <a:r>
+              <a:rPr lang="en-US" sz="2200" b="1" dirty="0">
                 <a:effectLst>
                   <a:glow rad="38100">
                     <a:schemeClr val="bg1">
@@ -8619,10 +9403,10 @@
                   </a:glow>
                 </a:effectLst>
               </a:rPr>
-              <a:t>SLP</a:t>
-            </a:r>
-            <a:r>
-              <a:rPr lang="en-US" b="1" dirty="0">
+              <a:t> (</a:t>
+            </a:r>
+            <a:r>
+              <a:rPr lang="sk-SK" sz="2200" b="1" dirty="0">
                 <a:effectLst>
                   <a:glow rad="38100">
                     <a:schemeClr val="bg1">
@@ -8633,320 +9417,487 @@
                   </a:glow>
                 </a:effectLst>
               </a:rPr>
+              <a:t>SLP</a:t>
+            </a:r>
+            <a:r>
+              <a:rPr lang="en-US" sz="2200" b="1" dirty="0">
+                <a:effectLst>
+                  <a:glow rad="38100">
+                    <a:schemeClr val="bg1">
+                      <a:lumMod val="50000"/>
+                      <a:lumOff val="50000"/>
+                      <a:alpha val="20000"/>
+                    </a:schemeClr>
+                  </a:glow>
+                </a:effectLst>
+              </a:rPr>
               <a:t>)</a:t>
             </a:r>
           </a:p>
           <a:p>
             <a:r>
-              <a:rPr lang="sk-SK" b="1" dirty="0">
+              <a:rPr lang="sk-SK" sz="2100" b="1" dirty="0">
                 <a:effectLst/>
               </a:rPr>
-              <a:t>Output = </a:t>
-            </a:r>
-            <a:r>
-              <a:rPr lang="en-US" b="1" dirty="0">
+              <a:t>OUTPUT = </a:t>
+            </a:r>
+            <a:r>
+              <a:rPr lang="en-US" sz="2100" b="1" dirty="0">
                 <a:effectLst/>
               </a:rPr>
               <a:t>(</a:t>
             </a:r>
             <a:r>
-              <a:rPr lang="sk-SK" b="1" dirty="0" err="1">
+              <a:rPr lang="sk-SK" sz="2100" b="1" dirty="0">
                 <a:effectLst/>
               </a:rPr>
-              <a:t>Input</a:t>
-            </a:r>
-            <a:r>
-              <a:rPr lang="en-US" b="1" dirty="0">
+              <a:t>INPUT</a:t>
+            </a:r>
+            <a:r>
+              <a:rPr lang="en-US" sz="2100" b="1" dirty="0">
                 <a:effectLst/>
               </a:rPr>
               <a:t> * </a:t>
             </a:r>
             <a:r>
-              <a:rPr lang="sk-SK" b="1" dirty="0" err="1">
+              <a:rPr lang="sk-SK" sz="2100" b="1" dirty="0">
                 <a:effectLst/>
               </a:rPr>
-              <a:t>Weight</a:t>
-            </a:r>
-            <a:r>
-              <a:rPr lang="en-US" b="1" dirty="0">
+              <a:t>WEIGHT</a:t>
+            </a:r>
+            <a:r>
+              <a:rPr lang="en-US" sz="2100" b="1" dirty="0">
                 <a:effectLst/>
               </a:rPr>
               <a:t>)</a:t>
             </a:r>
             <a:r>
-              <a:rPr lang="sk-SK" b="1" dirty="0">
+              <a:rPr lang="sk-SK" sz="2100" b="1" dirty="0">
                 <a:effectLst/>
               </a:rPr>
-              <a:t> + </a:t>
-            </a:r>
-            <a:r>
-              <a:rPr lang="sk-SK" b="1" dirty="0" err="1">
-                <a:effectLst/>
-              </a:rPr>
-              <a:t>Bias</a:t>
-            </a:r>
-            <a:endParaRPr lang="en-US" b="1" dirty="0">
+              <a:t> + BIAS</a:t>
+            </a:r>
+            <a:endParaRPr lang="en-US" sz="2100" b="1" dirty="0">
               <a:effectLst/>
             </a:endParaRPr>
           </a:p>
           <a:p>
             <a:r>
-              <a:rPr lang="en-US" dirty="0"/>
-              <a:t>Pre </a:t>
-            </a:r>
-            <a:r>
-              <a:rPr lang="en-US" dirty="0" err="1"/>
+              <a:rPr lang="en-US" sz="2200" dirty="0"/>
+              <a:t>pre </a:t>
+            </a:r>
+            <a:r>
+              <a:rPr lang="en-US" sz="2200" dirty="0" err="1"/>
               <a:t>túto</a:t>
             </a:r>
             <a:r>
-              <a:rPr lang="en-US" dirty="0"/>
+              <a:rPr lang="en-US" sz="2200" dirty="0"/>
               <a:t> </a:t>
             </a:r>
             <a:r>
-              <a:rPr lang="en-US" dirty="0" err="1"/>
+              <a:rPr lang="en-US" sz="2200" dirty="0" err="1"/>
               <a:t>rovnicu</a:t>
             </a:r>
             <a:r>
-              <a:rPr lang="en-US" dirty="0"/>
+              <a:rPr lang="en-US" sz="2200" dirty="0"/>
               <a:t> </a:t>
             </a:r>
             <a:r>
-              <a:rPr lang="en-US" dirty="0" err="1"/>
+              <a:rPr lang="en-US" sz="2200" dirty="0" err="1"/>
               <a:t>už</a:t>
             </a:r>
             <a:r>
-              <a:rPr lang="en-US" dirty="0"/>
+              <a:rPr lang="en-US" sz="2200" dirty="0"/>
               <a:t> </a:t>
             </a:r>
             <a:r>
-              <a:rPr lang="en-US" dirty="0" err="1"/>
+              <a:rPr lang="en-US" sz="2200" dirty="0" err="1"/>
               <a:t>máme</a:t>
             </a:r>
             <a:r>
-              <a:rPr lang="en-US" dirty="0"/>
+              <a:rPr lang="en-US" sz="2200" dirty="0"/>
               <a:t> </a:t>
             </a:r>
             <a:r>
-              <a:rPr lang="en-US" dirty="0" err="1"/>
+              <a:rPr lang="en-US" sz="2200" dirty="0" err="1"/>
               <a:t>výstupné</a:t>
             </a:r>
             <a:r>
-              <a:rPr lang="en-US" dirty="0"/>
+              <a:rPr lang="en-US" sz="2200" dirty="0"/>
               <a:t> </a:t>
             </a:r>
             <a:r>
-              <a:rPr lang="en-US" dirty="0" err="1"/>
+              <a:rPr lang="en-US" sz="2200" dirty="0" err="1"/>
               <a:t>vrstvy</a:t>
             </a:r>
             <a:r>
-              <a:rPr lang="en-US" dirty="0"/>
+              <a:rPr lang="en-US" sz="2200" dirty="0"/>
               <a:t>, </a:t>
             </a:r>
             <a:r>
-              <a:rPr lang="en-US" dirty="0" err="1"/>
+              <a:rPr lang="en-US" sz="2200" dirty="0" err="1"/>
               <a:t>nem</a:t>
             </a:r>
             <a:r>
-              <a:rPr lang="sk-SK" dirty="0" err="1"/>
+              <a:rPr lang="sk-SK" sz="2200" dirty="0" err="1"/>
               <a:t>áme</a:t>
             </a:r>
             <a:r>
-              <a:rPr lang="en-US" dirty="0"/>
+              <a:rPr lang="en-US" sz="2200" dirty="0"/>
               <a:t> </a:t>
             </a:r>
             <a:r>
-              <a:rPr lang="en-US" dirty="0" err="1"/>
+              <a:rPr lang="en-US" sz="2200" dirty="0" err="1"/>
               <a:t>však</a:t>
             </a:r>
             <a:r>
-              <a:rPr lang="en-US" dirty="0"/>
+              <a:rPr lang="en-US" sz="2200" dirty="0"/>
               <a:t> </a:t>
             </a:r>
             <a:r>
-              <a:rPr lang="en-US" dirty="0" err="1"/>
+              <a:rPr lang="en-US" sz="2200" dirty="0" err="1"/>
               <a:t>hodnot</a:t>
             </a:r>
             <a:r>
-              <a:rPr lang="sk-SK" dirty="0"/>
+              <a:rPr lang="sk-SK" sz="2200" dirty="0"/>
               <a:t>y </a:t>
             </a:r>
             <a:r>
-              <a:rPr lang="sk-SK" dirty="0" err="1"/>
+              <a:rPr lang="sk-SK" sz="2200" dirty="0" err="1"/>
               <a:t>weights</a:t>
             </a:r>
             <a:r>
-              <a:rPr lang="sk-SK" dirty="0"/>
+              <a:rPr lang="sk-SK" sz="2200" dirty="0"/>
               <a:t> a </a:t>
             </a:r>
             <a:r>
-              <a:rPr lang="sk-SK" dirty="0" err="1"/>
+              <a:rPr lang="sk-SK" sz="2200" dirty="0" err="1"/>
               <a:t>bias</a:t>
             </a:r>
-            <a:endParaRPr lang="en-US" dirty="0"/>
-          </a:p>
-          <a:p>
-            <a:r>
-              <a:rPr lang="sk-SK" b="1" dirty="0" err="1"/>
-              <a:t>Perceptrón</a:t>
-            </a:r>
-            <a:r>
-              <a:rPr lang="sk-SK" dirty="0"/>
-              <a:t> je najjednoduchšia forma neurónovej siete, používaná na klasifikáciu vzorov, ktoré sú lineárne separovateľné, napr. </a:t>
-            </a:r>
-            <a:r>
-              <a:rPr lang="sk-SK" dirty="0" err="1"/>
-              <a:t>booleanovský</a:t>
-            </a:r>
-            <a:r>
-              <a:rPr lang="sk-SK" dirty="0"/>
-              <a:t> AND, OR,</a:t>
-            </a:r>
-            <a:br>
-              <a:rPr lang="sk-SK" dirty="0"/>
-            </a:br>
-            <a:r>
-              <a:rPr lang="sk-SK" dirty="0"/>
-              <a:t>(problém XOR nie je lineárne separovateľný). </a:t>
-            </a:r>
-            <a:endParaRPr lang="en-US" dirty="0"/>
-          </a:p>
-          <a:p>
-            <a:r>
-              <a:rPr lang="en-US" b="1" dirty="0"/>
-              <a:t>Bias</a:t>
-            </a:r>
-            <a:r>
-              <a:rPr lang="sk-SK" b="1" dirty="0"/>
-              <a:t> - </a:t>
-            </a:r>
-            <a:r>
-              <a:rPr lang="sk-SK" dirty="0"/>
-              <a:t>je doplnkový vstupný neurón </a:t>
-            </a:r>
-            <a:br>
-              <a:rPr lang="sk-SK" dirty="0"/>
-            </a:br>
-            <a:r>
-              <a:rPr lang="sk-SK" dirty="0"/>
-              <a:t>s hodnotou +1, a</a:t>
-            </a:r>
-            <a:r>
-              <a:rPr lang="pt-BR" dirty="0"/>
+            <a:endParaRPr lang="en-US" sz="2200" dirty="0"/>
+          </a:p>
+          <a:p>
+            <a:r>
+              <a:rPr lang="en-US" sz="2100" b="1" dirty="0">
+                <a:effectLst>
+                  <a:glow rad="38100">
+                    <a:schemeClr val="bg1">
+                      <a:lumMod val="50000"/>
+                      <a:lumOff val="50000"/>
+                      <a:alpha val="20000"/>
+                    </a:schemeClr>
+                  </a:glow>
+                </a:effectLst>
+              </a:rPr>
+              <a:t>WEIGHT (V</a:t>
+            </a:r>
+            <a:r>
+              <a:rPr lang="sk-SK" sz="2100" b="1" dirty="0">
+                <a:effectLst>
+                  <a:glow rad="38100">
+                    <a:schemeClr val="bg1">
+                      <a:lumMod val="50000"/>
+                      <a:lumOff val="50000"/>
+                      <a:alpha val="20000"/>
+                    </a:schemeClr>
+                  </a:glow>
+                </a:effectLst>
+              </a:rPr>
+              <a:t>ÁHY</a:t>
+            </a:r>
+            <a:r>
+              <a:rPr lang="en-US" sz="2100" b="1" dirty="0">
+                <a:effectLst>
+                  <a:glow rad="38100">
+                    <a:schemeClr val="bg1">
+                      <a:lumMod val="50000"/>
+                      <a:lumOff val="50000"/>
+                      <a:alpha val="20000"/>
+                    </a:schemeClr>
+                  </a:glow>
+                </a:effectLst>
+              </a:rPr>
+              <a:t>) – </a:t>
+            </a:r>
+            <a:r>
+              <a:rPr lang="en-US" sz="2200" dirty="0" err="1">
+                <a:effectLst>
+                  <a:glow rad="38100">
+                    <a:schemeClr val="bg1">
+                      <a:lumMod val="50000"/>
+                      <a:lumOff val="50000"/>
+                      <a:alpha val="20000"/>
+                    </a:schemeClr>
+                  </a:glow>
+                </a:effectLst>
+              </a:rPr>
+              <a:t>skal</a:t>
+            </a:r>
+            <a:r>
+              <a:rPr lang="sk-SK" sz="2200" dirty="0" err="1">
+                <a:effectLst>
+                  <a:glow rad="38100">
+                    <a:schemeClr val="bg1">
+                      <a:lumMod val="50000"/>
+                      <a:lumOff val="50000"/>
+                      <a:alpha val="20000"/>
+                    </a:schemeClr>
+                  </a:glow>
+                </a:effectLst>
+              </a:rPr>
+              <a:t>árne</a:t>
+            </a:r>
+            <a:r>
+              <a:rPr lang="sk-SK" sz="2200" dirty="0">
+                <a:effectLst>
+                  <a:glow rad="38100">
+                    <a:schemeClr val="bg1">
+                      <a:lumMod val="50000"/>
+                      <a:lumOff val="50000"/>
+                      <a:alpha val="20000"/>
+                    </a:schemeClr>
+                  </a:glow>
+                </a:effectLst>
+              </a:rPr>
+              <a:t> hodnoty, ktorými vynásobíme každý vstup skôr ako vstúpi do aktivačnej metódy, hodnoty váh sú také, ktoré sa v </a:t>
+            </a:r>
+            <a:r>
+              <a:rPr lang="sk-SK" sz="2200" dirty="0" err="1">
+                <a:effectLst>
+                  <a:glow rad="38100">
+                    <a:schemeClr val="bg1">
+                      <a:lumMod val="50000"/>
+                      <a:lumOff val="50000"/>
+                      <a:alpha val="20000"/>
+                    </a:schemeClr>
+                  </a:glow>
+                </a:effectLst>
+              </a:rPr>
+              <a:t>perceptróne</a:t>
+            </a:r>
+            <a:r>
+              <a:rPr lang="sk-SK" sz="2200" dirty="0">
+                <a:effectLst>
+                  <a:glow rad="38100">
+                    <a:schemeClr val="bg1">
+                      <a:lumMod val="50000"/>
+                      <a:lumOff val="50000"/>
+                      <a:alpha val="20000"/>
+                    </a:schemeClr>
+                  </a:glow>
+                </a:effectLst>
+              </a:rPr>
+              <a:t> natrénujú takým spôsobom, aby sa minimalizovala určitá metrika chýb medzi </a:t>
+            </a:r>
+            <a:r>
+              <a:rPr lang="sk-SK" sz="2200" b="1" dirty="0">
+                <a:effectLst>
+                  <a:glow rad="38100">
+                    <a:schemeClr val="bg1">
+                      <a:lumMod val="50000"/>
+                      <a:lumOff val="50000"/>
+                      <a:alpha val="20000"/>
+                    </a:schemeClr>
+                  </a:glow>
+                </a:effectLst>
+              </a:rPr>
+              <a:t>y </a:t>
+            </a:r>
+            <a:r>
+              <a:rPr lang="sk-SK" sz="2200" dirty="0">
+                <a:effectLst>
+                  <a:glow rad="38100">
+                    <a:schemeClr val="bg1">
+                      <a:lumMod val="50000"/>
+                      <a:lumOff val="50000"/>
+                      <a:alpha val="20000"/>
+                    </a:schemeClr>
+                  </a:glow>
+                </a:effectLst>
+              </a:rPr>
+              <a:t>a </a:t>
+            </a:r>
+            <a:r>
+              <a:rPr lang="sk-SK" sz="2200" b="1" dirty="0">
+                <a:effectLst>
+                  <a:glow rad="38100">
+                    <a:schemeClr val="bg1">
+                      <a:lumMod val="50000"/>
+                      <a:lumOff val="50000"/>
+                      <a:alpha val="20000"/>
+                    </a:schemeClr>
+                  </a:glow>
+                </a:effectLst>
+              </a:rPr>
+              <a:t>y′</a:t>
+            </a:r>
+          </a:p>
+          <a:p>
+            <a:r>
+              <a:rPr lang="en-US" sz="2100" b="1" dirty="0">
+                <a:effectLst>
+                  <a:glow rad="38100">
+                    <a:schemeClr val="bg1">
+                      <a:lumMod val="50000"/>
+                      <a:lumOff val="50000"/>
+                      <a:alpha val="20000"/>
+                    </a:schemeClr>
+                  </a:glow>
+                </a:effectLst>
+              </a:rPr>
+              <a:t>BIAS</a:t>
+            </a:r>
+            <a:r>
+              <a:rPr lang="sk-SK" sz="2100" b="1" dirty="0"/>
+              <a:t> </a:t>
+            </a:r>
+            <a:r>
+              <a:rPr lang="en-US" sz="2100" b="1" dirty="0">
+                <a:effectLst>
+                  <a:glow rad="38100">
+                    <a:schemeClr val="bg1">
+                      <a:lumMod val="50000"/>
+                      <a:lumOff val="50000"/>
+                      <a:alpha val="20000"/>
+                    </a:schemeClr>
+                  </a:glow>
+                </a:effectLst>
+              </a:rPr>
+              <a:t>–</a:t>
+            </a:r>
+            <a:r>
+              <a:rPr lang="sk-SK" sz="2100" b="1" dirty="0"/>
+              <a:t> </a:t>
+            </a:r>
+            <a:r>
+              <a:rPr lang="sk-SK" sz="2200" dirty="0"/>
+              <a:t>je doplnkový vstupný neurón s hodnotou </a:t>
+            </a:r>
+            <a:r>
+              <a:rPr lang="sk-SK" sz="2200" b="1" dirty="0"/>
+              <a:t>+1</a:t>
+            </a:r>
+            <a:r>
+              <a:rPr lang="sk-SK" sz="2200" dirty="0"/>
+              <a:t>, a</a:t>
+            </a:r>
+            <a:r>
+              <a:rPr lang="pt-BR" sz="2200" dirty="0"/>
               <a:t>k si predstav</a:t>
             </a:r>
             <a:r>
-              <a:rPr lang="sk-SK" dirty="0"/>
+              <a:rPr lang="sk-SK" sz="2200" dirty="0"/>
               <a:t>í</a:t>
             </a:r>
             <a:r>
-              <a:rPr lang="pt-BR" dirty="0"/>
+              <a:rPr lang="pt-BR" sz="2200" dirty="0"/>
               <a:t>me line</a:t>
             </a:r>
             <a:r>
-              <a:rPr lang="sk-SK" dirty="0"/>
+              <a:rPr lang="sk-SK" sz="2200" dirty="0"/>
               <a:t>á</a:t>
             </a:r>
             <a:r>
-              <a:rPr lang="pt-BR" dirty="0"/>
+              <a:rPr lang="pt-BR" sz="2200" dirty="0"/>
               <a:t>rne separovate</a:t>
             </a:r>
             <a:r>
-              <a:rPr lang="sk-SK" dirty="0"/>
+              <a:rPr lang="sk-SK" sz="2200" dirty="0"/>
               <a:t>ľ</a:t>
             </a:r>
             <a:r>
-              <a:rPr lang="pt-BR" dirty="0"/>
+              <a:rPr lang="pt-BR" sz="2200" dirty="0"/>
               <a:t>n</a:t>
             </a:r>
             <a:r>
-              <a:rPr lang="sk-SK" dirty="0"/>
+              <a:rPr lang="sk-SK" sz="2200" dirty="0"/>
               <a:t>é</a:t>
             </a:r>
             <a:r>
-              <a:rPr lang="pt-BR" dirty="0"/>
+              <a:rPr lang="pt-BR" sz="2200" dirty="0"/>
               <a:t> probl</a:t>
             </a:r>
             <a:r>
-              <a:rPr lang="sk-SK" dirty="0"/>
+              <a:rPr lang="sk-SK" sz="2200" dirty="0"/>
               <a:t>é</a:t>
             </a:r>
             <a:r>
-              <a:rPr lang="pt-BR" dirty="0"/>
+              <a:rPr lang="pt-BR" sz="2200" dirty="0"/>
               <a:t>my na grafe, pr</a:t>
             </a:r>
             <a:r>
-              <a:rPr lang="sk-SK" dirty="0"/>
+              <a:rPr lang="sk-SK" sz="2200" dirty="0"/>
               <a:t>á</a:t>
             </a:r>
             <a:r>
-              <a:rPr lang="pt-BR" dirty="0"/>
+              <a:rPr lang="pt-BR" sz="2200" dirty="0"/>
               <a:t>ve bias n</a:t>
             </a:r>
             <a:r>
-              <a:rPr lang="sk-SK" dirty="0"/>
+              <a:rPr lang="sk-SK" sz="2200" dirty="0"/>
               <a:t>á</a:t>
             </a:r>
             <a:r>
-              <a:rPr lang="pt-BR" dirty="0"/>
+              <a:rPr lang="pt-BR" sz="2200" dirty="0"/>
               <a:t>m um</a:t>
             </a:r>
             <a:r>
-              <a:rPr lang="sk-SK" dirty="0" err="1"/>
+              <a:rPr lang="sk-SK" sz="2200" dirty="0" err="1"/>
               <a:t>ožň</a:t>
             </a:r>
             <a:r>
-              <a:rPr lang="pt-BR" dirty="0"/>
+              <a:rPr lang="pt-BR" sz="2200" dirty="0"/>
               <a:t>uje aby priamka rozde</a:t>
             </a:r>
             <a:r>
-              <a:rPr lang="sk-SK" dirty="0"/>
+              <a:rPr lang="sk-SK" sz="2200" dirty="0"/>
               <a:t>ľ</a:t>
             </a:r>
             <a:r>
-              <a:rPr lang="pt-BR" dirty="0"/>
+              <a:rPr lang="pt-BR" sz="2200" dirty="0"/>
               <a:t>uj</a:t>
             </a:r>
             <a:r>
-              <a:rPr lang="sk-SK" dirty="0"/>
+              <a:rPr lang="sk-SK" sz="2200" dirty="0"/>
               <a:t>ú</a:t>
             </a:r>
             <a:r>
-              <a:rPr lang="pt-BR" dirty="0"/>
+              <a:rPr lang="pt-BR" sz="2200" dirty="0"/>
               <a:t>c</a:t>
             </a:r>
             <a:r>
-              <a:rPr lang="sk-SK" dirty="0"/>
+              <a:rPr lang="sk-SK" sz="2200" dirty="0"/>
               <a:t>a</a:t>
             </a:r>
             <a:r>
-              <a:rPr lang="pt-BR" dirty="0"/>
+              <a:rPr lang="pt-BR" sz="2200" dirty="0"/>
               <a:t> d</a:t>
             </a:r>
             <a:r>
-              <a:rPr lang="sk-SK" dirty="0"/>
+              <a:rPr lang="sk-SK" sz="2200" dirty="0"/>
               <a:t>á</a:t>
             </a:r>
             <a:r>
-              <a:rPr lang="pt-BR" dirty="0"/>
+              <a:rPr lang="pt-BR" sz="2200" dirty="0"/>
               <a:t>ta nemusela prech</a:t>
             </a:r>
             <a:r>
-              <a:rPr lang="sk-SK" dirty="0"/>
+              <a:rPr lang="sk-SK" sz="2200" dirty="0"/>
               <a:t>á</a:t>
             </a:r>
             <a:r>
-              <a:rPr lang="pt-BR" dirty="0"/>
+              <a:rPr lang="pt-BR" sz="2200" dirty="0"/>
               <a:t>dza</a:t>
             </a:r>
             <a:r>
-              <a:rPr lang="sk-SK" dirty="0"/>
+              <a:rPr lang="sk-SK" sz="2200" dirty="0"/>
               <a:t>ť</a:t>
             </a:r>
             <a:r>
-              <a:rPr lang="pt-BR" dirty="0"/>
+              <a:rPr lang="pt-BR" sz="2200" dirty="0"/>
               <a:t> stredom grafu</a:t>
             </a:r>
-            <a:endParaRPr lang="sk-SK" dirty="0"/>
+            <a:endParaRPr lang="sk-SK" sz="2200" dirty="0"/>
           </a:p>
         </p:txBody>
       </p:sp>
@@ -8978,7 +9929,7 @@
         </p:blipFill>
         <p:spPr>
           <a:xfrm>
-            <a:off x="6094412" y="2415972"/>
+            <a:off x="6287359" y="2917214"/>
             <a:ext cx="5698821" cy="3204652"/>
           </a:xfrm>
           <a:prstGeom prst="rect">
@@ -8999,7 +9950,7 @@
 </p:sld>
 </file>
 
-<file path=ppt/slides/slide3.xml><?xml version="1.0" encoding="utf-8"?>
+<file path=ppt/slides/slide4.xml><?xml version="1.0" encoding="utf-8"?>
 <p:sld xmlns:a="http://schemas.openxmlformats.org/drawingml/2006/main" xmlns:r="http://schemas.openxmlformats.org/officeDocument/2006/relationships" xmlns:p="http://schemas.openxmlformats.org/presentationml/2006/main">
   <p:cSld>
     <p:spTree>
@@ -9021,6 +9972,377 @@
           <p:cNvPr id="2" name="Nadpis 1">
             <a:extLst>
               <a:ext uri="{FF2B5EF4-FFF2-40B4-BE49-F238E27FC236}">
+                <a16:creationId xmlns:a16="http://schemas.microsoft.com/office/drawing/2014/main" id="{FFF275A3-C7EE-4A11-AB19-2BC0ED0EC686}"/>
+              </a:ext>
+            </a:extLst>
+          </p:cNvPr>
+          <p:cNvSpPr>
+            <a:spLocks noGrp="1"/>
+          </p:cNvSpPr>
+          <p:nvPr>
+            <p:ph type="title"/>
+          </p:nvPr>
+        </p:nvSpPr>
+        <p:spPr>
+          <a:xfrm>
+            <a:off x="1141413" y="785769"/>
+            <a:ext cx="9905998" cy="1905000"/>
+          </a:xfrm>
+        </p:spPr>
+        <p:txBody>
+          <a:bodyPr/>
+          <a:lstStyle/>
+          <a:p>
+            <a:r>
+              <a:rPr lang="en-US" dirty="0" err="1"/>
+              <a:t>Tensorflow</a:t>
+            </a:r>
+            <a:endParaRPr lang="sk-SK" dirty="0"/>
+          </a:p>
+        </p:txBody>
+      </p:sp>
+      <p:sp>
+        <p:nvSpPr>
+          <p:cNvPr id="3" name="Zástupný objekt pre obsah 2">
+            <a:extLst>
+              <a:ext uri="{FF2B5EF4-FFF2-40B4-BE49-F238E27FC236}">
+                <a16:creationId xmlns:a16="http://schemas.microsoft.com/office/drawing/2014/main" id="{509F2A42-349E-430B-A067-C89334EAE343}"/>
+              </a:ext>
+            </a:extLst>
+          </p:cNvPr>
+          <p:cNvSpPr>
+            <a:spLocks noGrp="1"/>
+          </p:cNvSpPr>
+          <p:nvPr>
+            <p:ph idx="1"/>
+          </p:nvPr>
+        </p:nvSpPr>
+        <p:spPr>
+          <a:xfrm>
+            <a:off x="1141414" y="2189527"/>
+            <a:ext cx="10661896" cy="4058873"/>
+          </a:xfrm>
+        </p:spPr>
+        <p:txBody>
+          <a:bodyPr>
+            <a:normAutofit/>
+          </a:bodyPr>
+          <a:lstStyle/>
+          <a:p>
+            <a:pPr marL="0" indent="0">
+              <a:buNone/>
+            </a:pPr>
+            <a:r>
+              <a:rPr lang="sk-SK" dirty="0"/>
+              <a:t>Prečo </a:t>
+            </a:r>
+            <a:r>
+              <a:rPr lang="sk-SK" dirty="0" err="1"/>
+              <a:t>TensorFlow</a:t>
+            </a:r>
+            <a:r>
+              <a:rPr lang="en-US" dirty="0"/>
+              <a:t>?</a:t>
+            </a:r>
+          </a:p>
+          <a:p>
+            <a:pPr marL="0" indent="0">
+              <a:buNone/>
+            </a:pPr>
+            <a:endParaRPr lang="sk-SK" dirty="0"/>
+          </a:p>
+          <a:p>
+            <a:r>
+              <a:rPr lang="sk-SK" dirty="0"/>
+              <a:t>platforma typu end-to-end, ktorá </a:t>
+            </a:r>
+            <a:r>
+              <a:rPr lang="en-US" dirty="0"/>
+              <a:t>n</a:t>
+            </a:r>
+            <a:r>
+              <a:rPr lang="sk-SK" dirty="0" err="1"/>
+              <a:t>ám</a:t>
+            </a:r>
+            <a:r>
+              <a:rPr lang="sk-SK" dirty="0"/>
+              <a:t> uľahčuje vytváranie a nasadzovanie modelov M</a:t>
+            </a:r>
+            <a:r>
+              <a:rPr lang="en-US" dirty="0"/>
+              <a:t>L</a:t>
+            </a:r>
+          </a:p>
+          <a:p>
+            <a:pPr marL="0" indent="0">
+              <a:buNone/>
+            </a:pPr>
+            <a:endParaRPr lang="en-US" dirty="0"/>
+          </a:p>
+          <a:p>
+            <a:pPr marL="0" indent="0">
+              <a:buNone/>
+            </a:pPr>
+            <a:r>
+              <a:rPr lang="en-US" dirty="0" err="1"/>
+              <a:t>Výkonné</a:t>
+            </a:r>
+            <a:r>
+              <a:rPr lang="en-US" dirty="0"/>
+              <a:t> </a:t>
+            </a:r>
+            <a:r>
+              <a:rPr lang="en-US" dirty="0" err="1"/>
+              <a:t>experimentovanie</a:t>
+            </a:r>
+            <a:r>
+              <a:rPr lang="en-US" dirty="0"/>
+              <a:t> pre </a:t>
+            </a:r>
+            <a:r>
+              <a:rPr lang="en-US" dirty="0" err="1"/>
+              <a:t>výskum</a:t>
+            </a:r>
+            <a:endParaRPr lang="en-US" dirty="0"/>
+          </a:p>
+          <a:p>
+            <a:r>
+              <a:rPr lang="en-US" dirty="0" err="1"/>
+              <a:t>Sl</a:t>
+            </a:r>
+            <a:r>
+              <a:rPr lang="sk-SK" dirty="0"/>
+              <a:t>úži na </a:t>
+            </a:r>
+            <a:r>
+              <a:rPr lang="en-US" dirty="0"/>
+              <a:t>bud</a:t>
+            </a:r>
+            <a:r>
+              <a:rPr lang="sk-SK" dirty="0"/>
+              <a:t>ovanie</a:t>
+            </a:r>
+            <a:r>
+              <a:rPr lang="en-US" dirty="0"/>
+              <a:t> a </a:t>
+            </a:r>
+            <a:r>
+              <a:rPr lang="en-US" dirty="0" err="1"/>
+              <a:t>tré</a:t>
+            </a:r>
+            <a:r>
+              <a:rPr lang="sk-SK" dirty="0" err="1"/>
+              <a:t>novanie</a:t>
+            </a:r>
+            <a:r>
+              <a:rPr lang="en-US" dirty="0"/>
+              <a:t> </a:t>
+            </a:r>
+            <a:r>
+              <a:rPr lang="en-US" dirty="0" err="1"/>
+              <a:t>najmodernejš</a:t>
+            </a:r>
+            <a:r>
+              <a:rPr lang="sk-SK" dirty="0" err="1"/>
+              <a:t>ích</a:t>
+            </a:r>
+            <a:r>
+              <a:rPr lang="en-US" dirty="0"/>
+              <a:t> model</a:t>
+            </a:r>
+            <a:r>
+              <a:rPr lang="sk-SK" dirty="0" err="1"/>
+              <a:t>ov</a:t>
+            </a:r>
+            <a:r>
+              <a:rPr lang="en-US" dirty="0"/>
+              <a:t> bez </a:t>
+            </a:r>
+            <a:r>
+              <a:rPr lang="en-US" dirty="0" err="1"/>
+              <a:t>zníženia</a:t>
+            </a:r>
+            <a:r>
+              <a:rPr lang="en-US" dirty="0"/>
+              <a:t> </a:t>
+            </a:r>
+            <a:r>
+              <a:rPr lang="en-US" dirty="0" err="1"/>
+              <a:t>rýchlosti</a:t>
+            </a:r>
+            <a:r>
+              <a:rPr lang="en-US" dirty="0"/>
+              <a:t> </a:t>
+            </a:r>
+            <a:r>
+              <a:rPr lang="en-US" dirty="0" err="1"/>
+              <a:t>alebo</a:t>
+            </a:r>
+            <a:r>
+              <a:rPr lang="en-US" dirty="0"/>
+              <a:t> </a:t>
+            </a:r>
+            <a:r>
+              <a:rPr lang="en-US" dirty="0" err="1"/>
+              <a:t>výkonu</a:t>
+            </a:r>
+            <a:endParaRPr lang="sk-SK" dirty="0"/>
+          </a:p>
+          <a:p>
+            <a:r>
+              <a:rPr lang="en-US" dirty="0"/>
+              <a:t>TensorFlow </a:t>
+            </a:r>
+            <a:r>
+              <a:rPr lang="en-US" dirty="0" err="1"/>
+              <a:t>nám</a:t>
+            </a:r>
+            <a:r>
+              <a:rPr lang="en-US" dirty="0"/>
+              <a:t> </a:t>
+            </a:r>
+            <a:r>
+              <a:rPr lang="en-US" dirty="0" err="1"/>
+              <a:t>poskytuje</a:t>
+            </a:r>
+            <a:r>
+              <a:rPr lang="en-US" dirty="0"/>
+              <a:t> </a:t>
+            </a:r>
+            <a:r>
+              <a:rPr lang="en-US" dirty="0" err="1"/>
+              <a:t>flexibilitu</a:t>
+            </a:r>
+            <a:r>
+              <a:rPr lang="en-US" dirty="0"/>
+              <a:t> a </a:t>
+            </a:r>
+            <a:r>
+              <a:rPr lang="en-US" dirty="0" err="1"/>
+              <a:t>kontrolu</a:t>
+            </a:r>
+            <a:r>
+              <a:rPr lang="en-US" dirty="0"/>
+              <a:t> </a:t>
+            </a:r>
+            <a:r>
+              <a:rPr lang="en-US" dirty="0" err="1"/>
+              <a:t>pomocou</a:t>
+            </a:r>
+            <a:r>
+              <a:rPr lang="en-US" dirty="0"/>
+              <a:t> </a:t>
+            </a:r>
+            <a:r>
+              <a:rPr lang="en-US" dirty="0" err="1"/>
+              <a:t>funkcií</a:t>
+            </a:r>
+            <a:r>
+              <a:rPr lang="en-US" dirty="0"/>
+              <a:t>, </a:t>
+            </a:r>
+            <a:r>
+              <a:rPr lang="en-US" dirty="0" err="1"/>
+              <a:t>ako</a:t>
+            </a:r>
+            <a:r>
+              <a:rPr lang="en-US" dirty="0"/>
+              <a:t> je </a:t>
+            </a:r>
+            <a:r>
+              <a:rPr lang="en-US" dirty="0" err="1"/>
+              <a:t>napríklad</a:t>
+            </a:r>
+            <a:r>
+              <a:rPr lang="en-US" dirty="0"/>
+              <a:t> </a:t>
+            </a:r>
+            <a:r>
+              <a:rPr lang="en-US" dirty="0" err="1"/>
+              <a:t>Keras</a:t>
+            </a:r>
+            <a:r>
+              <a:rPr lang="en-US" dirty="0"/>
+              <a:t> Functional API a Model </a:t>
+            </a:r>
+            <a:r>
+              <a:rPr lang="en-US" dirty="0" err="1"/>
+              <a:t>Subclassing</a:t>
+            </a:r>
+            <a:r>
+              <a:rPr lang="en-US" dirty="0"/>
+              <a:t> API, </a:t>
+            </a:r>
+            <a:r>
+              <a:rPr lang="en-US" dirty="0" err="1"/>
+              <a:t>na</a:t>
+            </a:r>
+            <a:r>
+              <a:rPr lang="en-US" dirty="0"/>
+              <a:t> </a:t>
+            </a:r>
+            <a:r>
+              <a:rPr lang="en-US" dirty="0" err="1"/>
+              <a:t>vytváranie</a:t>
+            </a:r>
+            <a:r>
+              <a:rPr lang="en-US" dirty="0"/>
+              <a:t> </a:t>
+            </a:r>
+            <a:r>
+              <a:rPr lang="en-US" dirty="0" err="1"/>
+              <a:t>komplexných</a:t>
+            </a:r>
+            <a:r>
+              <a:rPr lang="en-US" dirty="0"/>
+              <a:t> </a:t>
+            </a:r>
+            <a:r>
+              <a:rPr lang="en-US" dirty="0" err="1"/>
+              <a:t>topológií</a:t>
+            </a:r>
+            <a:endParaRPr lang="en-US" dirty="0"/>
+          </a:p>
+          <a:p>
+            <a:endParaRPr lang="sk-SK" dirty="0"/>
+          </a:p>
+        </p:txBody>
+      </p:sp>
+    </p:spTree>
+    <p:extLst>
+      <p:ext uri="{BB962C8B-B14F-4D97-AF65-F5344CB8AC3E}">
+        <p14:creationId xmlns:p14="http://schemas.microsoft.com/office/powerpoint/2010/main" val="260930747"/>
+      </p:ext>
+    </p:extLst>
+  </p:cSld>
+  <p:clrMapOvr>
+    <a:masterClrMapping/>
+  </p:clrMapOvr>
+</p:sld>
+</file>
+
+<file path=ppt/slides/slide5.xml><?xml version="1.0" encoding="utf-8"?>
+<p:sld xmlns:a="http://schemas.openxmlformats.org/drawingml/2006/main" xmlns:r="http://schemas.openxmlformats.org/officeDocument/2006/relationships" xmlns:p="http://schemas.openxmlformats.org/presentationml/2006/main">
+  <p:cSld>
+    <p:spTree>
+      <p:nvGrpSpPr>
+        <p:cNvPr id="1" name=""/>
+        <p:cNvGrpSpPr/>
+        <p:nvPr/>
+      </p:nvGrpSpPr>
+      <p:grpSpPr>
+        <a:xfrm>
+          <a:off x="0" y="0"/>
+          <a:ext cx="0" cy="0"/>
+          <a:chOff x="0" y="0"/>
+          <a:chExt cx="0" cy="0"/>
+        </a:xfrm>
+      </p:grpSpPr>
+      <p:sp>
+        <p:nvSpPr>
+          <p:cNvPr id="2" name="Nadpis 1">
+            <a:extLst>
+              <a:ext uri="{FF2B5EF4-FFF2-40B4-BE49-F238E27FC236}">
                 <a16:creationId xmlns:a16="http://schemas.microsoft.com/office/drawing/2014/main" id="{912075FB-432E-4229-847B-A82CC5A9689C}"/>
               </a:ext>
             </a:extLst>
@@ -9098,7 +10420,19 @@
             </a:pPr>
             <a:r>
               <a:rPr lang="sk-SK" sz="1800" dirty="0"/>
-              <a:t>Ak sú výsledky predpovede viac ako 2 faktory, je pohodlnejšie používať </a:t>
+              <a:t>Ak sú výsledky predpovede viac ako 2 faktory, je </a:t>
+            </a:r>
+            <a:r>
+              <a:rPr lang="en-US" sz="1800" dirty="0" err="1"/>
+              <a:t>lep</a:t>
+            </a:r>
+            <a:r>
+              <a:rPr lang="sk-SK" sz="1800" dirty="0" err="1"/>
+              <a:t>šie</a:t>
+            </a:r>
+            <a:r>
+              <a:rPr lang="sk-SK" sz="1800" dirty="0"/>
+              <a:t> používať </a:t>
             </a:r>
             <a:r>
               <a:rPr lang="sk-SK" sz="1800" dirty="0" err="1"/>
@@ -9109,6 +10443,14 @@
               <a:t>-Hot </a:t>
             </a:r>
             <a:r>
+              <a:rPr lang="sk-SK" sz="1800" dirty="0" err="1"/>
+              <a:t>encoding</a:t>
+            </a:r>
+            <a:r>
+              <a:rPr lang="sk-SK" sz="1800" dirty="0"/>
+              <a:t> </a:t>
+            </a:r>
+            <a:r>
               <a:rPr lang="en-US" sz="1800" dirty="0"/>
               <a:t>(</a:t>
             </a:r>
@@ -9117,14 +10459,13 @@
               <a:t>jednorazové</a:t>
             </a:r>
             <a:r>
+              <a:rPr lang="sk-SK" sz="1800" dirty="0"/>
+              <a:t> kódovanie</a:t>
+            </a:r>
+            <a:r>
               <a:rPr lang="en-US" sz="1800" dirty="0"/>
               <a:t>)</a:t>
             </a:r>
-            <a:r>
-              <a:rPr lang="sk-SK" sz="1800" dirty="0"/>
-              <a:t> kódovanie.</a:t>
-            </a:r>
-            <a:endParaRPr lang="en-US" sz="1800" dirty="0"/>
           </a:p>
           <a:p>
             <a:pPr>
@@ -9137,7 +10478,7 @@
             </a:r>
             <a:r>
               <a:rPr lang="sk-SK" sz="1800" dirty="0"/>
-              <a:t> kódovanie nám umožňuje premeniť nominálne kategorické údaje na vlastnosti s číselnými hodnotami, zatiaľ čo matematicky neimplikujú žiadny ordinálny vzťah medzi triedami.</a:t>
+              <a:t> kódovanie nám umožňuje premeniť nominálne kategorické údaje na vlastnosti s číselnými hodnotami, zatiaľ čo matematicky neimplikujú žiadny ordinálny vzťah medzi triedami</a:t>
             </a:r>
           </a:p>
         </p:txBody>
@@ -9170,12 +10511,17 @@
         </p:blipFill>
         <p:spPr>
           <a:xfrm>
-            <a:off x="2126696" y="4030682"/>
+            <a:off x="2126696" y="3980348"/>
             <a:ext cx="7935432" cy="2638793"/>
           </a:xfrm>
           <a:prstGeom prst="rect">
             <a:avLst/>
           </a:prstGeom>
+          <a:ln>
+            <a:solidFill>
+              <a:schemeClr val="tx1"/>
+            </a:solidFill>
+          </a:ln>
         </p:spPr>
       </p:pic>
     </p:spTree>
@@ -9191,7 +10537,7 @@
 </p:sld>
 </file>
 
-<file path=ppt/slides/slide4.xml><?xml version="1.0" encoding="utf-8"?>
+<file path=ppt/slides/slide6.xml><?xml version="1.0" encoding="utf-8"?>
 <p:sld xmlns:a="http://schemas.openxmlformats.org/drawingml/2006/main" xmlns:r="http://schemas.openxmlformats.org/officeDocument/2006/relationships" xmlns:p="http://schemas.openxmlformats.org/presentationml/2006/main">
   <p:cSld>
     <p:spTree>
@@ -9252,7 +10598,11 @@
             </a:r>
             <a:r>
               <a:rPr lang="en-US" dirty="0"/>
-              <a:t> (python)</a:t>
+              <a:t> (python) – </a:t>
+            </a:r>
+            <a:r>
+              <a:rPr lang="en-US" dirty="0" err="1"/>
+              <a:t>Tensorflow</a:t>
             </a:r>
             <a:endParaRPr lang="sk-SK" dirty="0"/>
           </a:p>
@@ -9342,7 +10692,7 @@
 </p:sld>
 </file>
 
-<file path=ppt/slides/slide5.xml><?xml version="1.0" encoding="utf-8"?>
+<file path=ppt/slides/slide7.xml><?xml version="1.0" encoding="utf-8"?>
 <p:sld xmlns:a="http://schemas.openxmlformats.org/drawingml/2006/main" xmlns:r="http://schemas.openxmlformats.org/officeDocument/2006/relationships" xmlns:p="http://schemas.openxmlformats.org/presentationml/2006/main">
   <p:cSld>
     <p:spTree>
@@ -9359,31 +10709,6 @@
           <a:chExt cx="0" cy="0"/>
         </a:xfrm>
       </p:grpSpPr>
-      <p:sp>
-        <p:nvSpPr>
-          <p:cNvPr id="2" name="Nadpis 1">
-            <a:extLst>
-              <a:ext uri="{FF2B5EF4-FFF2-40B4-BE49-F238E27FC236}">
-                <a16:creationId xmlns:a16="http://schemas.microsoft.com/office/drawing/2014/main" id="{FB56FA41-5575-490E-A8B9-B7DCDD50D2F1}"/>
-              </a:ext>
-            </a:extLst>
-          </p:cNvPr>
-          <p:cNvSpPr>
-            <a:spLocks noGrp="1"/>
-          </p:cNvSpPr>
-          <p:nvPr>
-            <p:ph type="title"/>
-          </p:nvPr>
-        </p:nvSpPr>
-        <p:spPr/>
-        <p:txBody>
-          <a:bodyPr/>
-          <a:lstStyle/>
-          <a:p>
-            <a:endParaRPr lang="sk-SK"/>
-          </a:p>
-        </p:txBody>
-      </p:sp>
       <p:pic>
         <p:nvPicPr>
           <p:cNvPr id="5" name="Zástupný objekt pre obsah 4">
@@ -9414,7 +10739,7 @@
         </p:blipFill>
         <p:spPr>
           <a:xfrm>
-            <a:off x="1141411" y="247560"/>
+            <a:off x="252178" y="247560"/>
             <a:ext cx="9906000" cy="2980020"/>
           </a:xfrm>
         </p:spPr>
@@ -9447,12 +10772,17 @@
         </p:blipFill>
         <p:spPr>
           <a:xfrm>
-            <a:off x="5587348" y="1737570"/>
+            <a:off x="6241690" y="1527846"/>
             <a:ext cx="5460063" cy="4931861"/>
           </a:xfrm>
           <a:prstGeom prst="rect">
             <a:avLst/>
           </a:prstGeom>
+          <a:ln>
+            <a:solidFill>
+              <a:schemeClr val="bg1"/>
+            </a:solidFill>
+          </a:ln>
         </p:spPr>
       </p:pic>
     </p:spTree>
@@ -9468,7 +10798,7 @@
 </p:sld>
 </file>
 
-<file path=ppt/slides/slide6.xml><?xml version="1.0" encoding="utf-8"?>
+<file path=ppt/slides/slide8.xml><?xml version="1.0" encoding="utf-8"?>
 <p:sld xmlns:a="http://schemas.openxmlformats.org/drawingml/2006/main" xmlns:r="http://schemas.openxmlformats.org/officeDocument/2006/relationships" xmlns:p="http://schemas.openxmlformats.org/presentationml/2006/main">
   <p:cSld>
     <p:spTree>
@@ -9485,31 +10815,6 @@
           <a:chExt cx="0" cy="0"/>
         </a:xfrm>
       </p:grpSpPr>
-      <p:sp>
-        <p:nvSpPr>
-          <p:cNvPr id="2" name="Nadpis 1">
-            <a:extLst>
-              <a:ext uri="{FF2B5EF4-FFF2-40B4-BE49-F238E27FC236}">
-                <a16:creationId xmlns:a16="http://schemas.microsoft.com/office/drawing/2014/main" id="{2F890866-9988-4F93-B05F-CFFE711C06EA}"/>
-              </a:ext>
-            </a:extLst>
-          </p:cNvPr>
-          <p:cNvSpPr>
-            <a:spLocks noGrp="1"/>
-          </p:cNvSpPr>
-          <p:nvPr>
-            <p:ph type="title"/>
-          </p:nvPr>
-        </p:nvSpPr>
-        <p:spPr/>
-        <p:txBody>
-          <a:bodyPr/>
-          <a:lstStyle/>
-          <a:p>
-            <a:endParaRPr lang="sk-SK"/>
-          </a:p>
-        </p:txBody>
-      </p:sp>
       <p:pic>
         <p:nvPicPr>
           <p:cNvPr id="13" name="Obrázok 12">
@@ -9538,7 +10843,7 @@
         </p:blipFill>
         <p:spPr>
           <a:xfrm>
-            <a:off x="243122" y="211512"/>
+            <a:off x="153798" y="171704"/>
             <a:ext cx="6184614" cy="4030828"/>
           </a:xfrm>
           <a:prstGeom prst="rect">
@@ -9574,219 +10879,23 @@
         </p:blipFill>
         <p:spPr>
           <a:xfrm>
-            <a:off x="3878472" y="3037763"/>
+            <a:off x="3870083" y="3012596"/>
             <a:ext cx="8168119" cy="3673700"/>
           </a:xfrm>
           <a:prstGeom prst="rect">
             <a:avLst/>
           </a:prstGeom>
+          <a:ln>
+            <a:solidFill>
+              <a:schemeClr val="bg1"/>
+            </a:solidFill>
+          </a:ln>
         </p:spPr>
       </p:pic>
     </p:spTree>
     <p:extLst>
       <p:ext uri="{BB962C8B-B14F-4D97-AF65-F5344CB8AC3E}">
         <p14:creationId xmlns:p14="http://schemas.microsoft.com/office/powerpoint/2010/main" val="4036760575"/>
-      </p:ext>
-    </p:extLst>
-  </p:cSld>
-  <p:clrMapOvr>
-    <a:masterClrMapping/>
-  </p:clrMapOvr>
-</p:sld>
-</file>
-
-<file path=ppt/slides/slide7.xml><?xml version="1.0" encoding="utf-8"?>
-<p:sld xmlns:a="http://schemas.openxmlformats.org/drawingml/2006/main" xmlns:r="http://schemas.openxmlformats.org/officeDocument/2006/relationships" xmlns:p="http://schemas.openxmlformats.org/presentationml/2006/main">
-  <p:cSld>
-    <p:spTree>
-      <p:nvGrpSpPr>
-        <p:cNvPr id="1" name=""/>
-        <p:cNvGrpSpPr/>
-        <p:nvPr/>
-      </p:nvGrpSpPr>
-      <p:grpSpPr>
-        <a:xfrm>
-          <a:off x="0" y="0"/>
-          <a:ext cx="0" cy="0"/>
-          <a:chOff x="0" y="0"/>
-          <a:chExt cx="0" cy="0"/>
-        </a:xfrm>
-      </p:grpSpPr>
-      <p:sp>
-        <p:nvSpPr>
-          <p:cNvPr id="2" name="Nadpis 1">
-            <a:extLst>
-              <a:ext uri="{FF2B5EF4-FFF2-40B4-BE49-F238E27FC236}">
-                <a16:creationId xmlns:a16="http://schemas.microsoft.com/office/drawing/2014/main" id="{185A2527-B31D-4CD7-BD13-60FB1292E629}"/>
-              </a:ext>
-            </a:extLst>
-          </p:cNvPr>
-          <p:cNvSpPr>
-            <a:spLocks noGrp="1"/>
-          </p:cNvSpPr>
-          <p:nvPr>
-            <p:ph type="title"/>
-          </p:nvPr>
-        </p:nvSpPr>
-        <p:spPr/>
-        <p:txBody>
-          <a:bodyPr/>
-          <a:lstStyle/>
-          <a:p>
-            <a:endParaRPr lang="sk-SK"/>
-          </a:p>
-        </p:txBody>
-      </p:sp>
-      <p:pic>
-        <p:nvPicPr>
-          <p:cNvPr id="4" name="Zástupný objekt pre obsah 3">
-            <a:extLst>
-              <a:ext uri="{FF2B5EF4-FFF2-40B4-BE49-F238E27FC236}">
-                <a16:creationId xmlns:a16="http://schemas.microsoft.com/office/drawing/2014/main" id="{8EAB993B-A03D-4DC5-A926-257FC5C0059D}"/>
-              </a:ext>
-            </a:extLst>
-          </p:cNvPr>
-          <p:cNvPicPr>
-            <a:picLocks noGrp="1" noChangeAspect="1"/>
-          </p:cNvPicPr>
-          <p:nvPr>
-            <p:ph idx="1"/>
-          </p:nvPr>
-        </p:nvPicPr>
-        <p:blipFill>
-          <a:blip r:embed="rId2">
-            <a:extLst>
-              <a:ext uri="{28A0092B-C50C-407E-A947-70E740481C1C}">
-                <a14:useLocalDpi xmlns:a14="http://schemas.microsoft.com/office/drawing/2010/main" val="0"/>
-              </a:ext>
-            </a:extLst>
-          </a:blip>
-          <a:stretch>
-            <a:fillRect/>
-          </a:stretch>
-        </p:blipFill>
-        <p:spPr>
-          <a:xfrm>
-            <a:off x="1717117" y="890243"/>
-            <a:ext cx="8754590" cy="5077513"/>
-          </a:xfrm>
-        </p:spPr>
-      </p:pic>
-    </p:spTree>
-    <p:extLst>
-      <p:ext uri="{BB962C8B-B14F-4D97-AF65-F5344CB8AC3E}">
-        <p14:creationId xmlns:p14="http://schemas.microsoft.com/office/powerpoint/2010/main" val="539526711"/>
-      </p:ext>
-    </p:extLst>
-  </p:cSld>
-  <p:clrMapOvr>
-    <a:masterClrMapping/>
-  </p:clrMapOvr>
-</p:sld>
-</file>
-
-<file path=ppt/slides/slide8.xml><?xml version="1.0" encoding="utf-8"?>
-<p:sld xmlns:a="http://schemas.openxmlformats.org/drawingml/2006/main" xmlns:r="http://schemas.openxmlformats.org/officeDocument/2006/relationships" xmlns:p="http://schemas.openxmlformats.org/presentationml/2006/main">
-  <p:cSld>
-    <p:spTree>
-      <p:nvGrpSpPr>
-        <p:cNvPr id="1" name=""/>
-        <p:cNvGrpSpPr/>
-        <p:nvPr/>
-      </p:nvGrpSpPr>
-      <p:grpSpPr>
-        <a:xfrm>
-          <a:off x="0" y="0"/>
-          <a:ext cx="0" cy="0"/>
-          <a:chOff x="0" y="0"/>
-          <a:chExt cx="0" cy="0"/>
-        </a:xfrm>
-      </p:grpSpPr>
-      <p:sp>
-        <p:nvSpPr>
-          <p:cNvPr id="3" name="Zástupný objekt pre obsah 2">
-            <a:extLst>
-              <a:ext uri="{FF2B5EF4-FFF2-40B4-BE49-F238E27FC236}">
-                <a16:creationId xmlns:a16="http://schemas.microsoft.com/office/drawing/2014/main" id="{6ED9B8A4-6811-41A8-A575-F133C8D04129}"/>
-              </a:ext>
-            </a:extLst>
-          </p:cNvPr>
-          <p:cNvSpPr>
-            <a:spLocks noGrp="1"/>
-          </p:cNvSpPr>
-          <p:nvPr>
-            <p:ph idx="1"/>
-          </p:nvPr>
-        </p:nvSpPr>
-        <p:spPr>
-          <a:xfrm>
-            <a:off x="7022316" y="1276177"/>
-            <a:ext cx="3701610" cy="3124201"/>
-          </a:xfrm>
-        </p:spPr>
-        <p:txBody>
-          <a:bodyPr/>
-          <a:lstStyle/>
-          <a:p>
-            <a:r>
-              <a:rPr lang="en-US" dirty="0" err="1"/>
-              <a:t>Softmax</a:t>
-            </a:r>
-            <a:r>
-              <a:rPr lang="en-US" dirty="0"/>
-              <a:t> - </a:t>
-            </a:r>
-            <a:r>
-              <a:rPr lang="pl-PL" dirty="0"/>
-              <a:t>normalizuje naše hodnoty na štandardný rozsah (0 až 1)</a:t>
-            </a:r>
-            <a:endParaRPr lang="en-US" dirty="0"/>
-          </a:p>
-          <a:p>
-            <a:endParaRPr lang="sk-SK" dirty="0"/>
-          </a:p>
-        </p:txBody>
-      </p:sp>
-      <p:pic>
-        <p:nvPicPr>
-          <p:cNvPr id="9" name="Obrázok 8">
-            <a:extLst>
-              <a:ext uri="{FF2B5EF4-FFF2-40B4-BE49-F238E27FC236}">
-                <a16:creationId xmlns:a16="http://schemas.microsoft.com/office/drawing/2014/main" id="{03FE78DD-BCBE-47A4-A0D2-57F548A0807A}"/>
-              </a:ext>
-            </a:extLst>
-          </p:cNvPr>
-          <p:cNvPicPr>
-            <a:picLocks noChangeAspect="1"/>
-          </p:cNvPicPr>
-          <p:nvPr/>
-        </p:nvPicPr>
-        <p:blipFill>
-          <a:blip r:embed="rId2">
-            <a:extLst>
-              <a:ext uri="{28A0092B-C50C-407E-A947-70E740481C1C}">
-                <a14:useLocalDpi xmlns:a14="http://schemas.microsoft.com/office/drawing/2010/main" val="0"/>
-              </a:ext>
-            </a:extLst>
-          </a:blip>
-          <a:stretch>
-            <a:fillRect/>
-          </a:stretch>
-        </p:blipFill>
-        <p:spPr>
-          <a:xfrm>
-            <a:off x="755997" y="1276177"/>
-            <a:ext cx="5169578" cy="2540814"/>
-          </a:xfrm>
-          <a:prstGeom prst="rect">
-            <a:avLst/>
-          </a:prstGeom>
-        </p:spPr>
-      </p:pic>
-    </p:spTree>
-    <p:extLst>
-      <p:ext uri="{BB962C8B-B14F-4D97-AF65-F5344CB8AC3E}">
-        <p14:creationId xmlns:p14="http://schemas.microsoft.com/office/powerpoint/2010/main" val="2167880227"/>
       </p:ext>
     </p:extLst>
   </p:cSld>
@@ -9813,327 +10922,21 @@
           <a:chExt cx="0" cy="0"/>
         </a:xfrm>
       </p:grpSpPr>
-      <p:sp>
-        <p:nvSpPr>
-          <p:cNvPr id="3" name="Zástupný objekt pre obsah 2">
+      <p:pic>
+        <p:nvPicPr>
+          <p:cNvPr id="4" name="Zástupný objekt pre obsah 3">
             <a:extLst>
               <a:ext uri="{FF2B5EF4-FFF2-40B4-BE49-F238E27FC236}">
-                <a16:creationId xmlns:a16="http://schemas.microsoft.com/office/drawing/2014/main" id="{04E20385-5EE4-4D94-8D38-EB83B332C05A}"/>
-              </a:ext>
-            </a:extLst>
-          </p:cNvPr>
-          <p:cNvSpPr>
-            <a:spLocks noGrp="1"/>
-          </p:cNvSpPr>
-          <p:nvPr>
-            <p:ph idx="1"/>
-          </p:nvPr>
-        </p:nvSpPr>
-        <p:spPr>
-          <a:xfrm>
-            <a:off x="536897" y="1693876"/>
-            <a:ext cx="7155808" cy="4933427"/>
-          </a:xfrm>
-        </p:spPr>
-        <p:txBody>
-          <a:bodyPr>
-            <a:normAutofit fontScale="77500" lnSpcReduction="20000"/>
-          </a:bodyPr>
-          <a:lstStyle/>
-          <a:p>
-            <a:pPr marL="0" indent="0">
-              <a:buNone/>
-            </a:pPr>
-            <a:r>
-              <a:rPr lang="sk-SK" b="1" dirty="0"/>
-              <a:t>Najprv musíme vedieť ako funguje lineárna regresia</a:t>
-            </a:r>
-            <a:r>
-              <a:rPr lang="en-US" b="1" dirty="0"/>
-              <a:t>:</a:t>
-            </a:r>
-            <a:endParaRPr lang="sk-SK" b="1" dirty="0"/>
-          </a:p>
-          <a:p>
-            <a:r>
-              <a:rPr lang="sk-SK" dirty="0">
-                <a:effectLst/>
-              </a:rPr>
-              <a:t>Lineárna regresia hľadá najlepšiu regresnú priamku pomocou techniky minimalizácie súčtu chýb na druhú</a:t>
-            </a:r>
-          </a:p>
-          <a:p>
-            <a:r>
-              <a:rPr lang="sk-SK" dirty="0">
-                <a:effectLst/>
-              </a:rPr>
-              <a:t>V tomto kontexte je chyba technický termín, ktorý označuje rozdiel medzi skutočnou hodnotou dátového bodu a hodnotou predpovedanou regresnou priamkou</a:t>
-            </a:r>
-          </a:p>
-          <a:p>
-            <a:r>
-              <a:rPr lang="sk-SK" dirty="0">
-                <a:effectLst/>
-              </a:rPr>
-              <a:t>Súčet chýb na druhú sa označuje aj ako r</a:t>
-            </a:r>
-            <a:r>
-              <a:rPr lang="sk-SK" baseline="30000" dirty="0">
-                <a:effectLst/>
-              </a:rPr>
-              <a:t>2</a:t>
-            </a:r>
-          </a:p>
-          <a:p>
-            <a:r>
-              <a:rPr lang="sk-SK" dirty="0">
-                <a:effectLst/>
-              </a:rPr>
-              <a:t>Cieľom funkcie lineárnej regresie je čo najviac minimalizovať r</a:t>
-            </a:r>
-            <a:r>
-              <a:rPr lang="sk-SK" baseline="30000" dirty="0">
-                <a:effectLst/>
-              </a:rPr>
-              <a:t>2</a:t>
-            </a:r>
-            <a:r>
-              <a:rPr lang="sk-SK" dirty="0">
-                <a:effectLst/>
-              </a:rPr>
-              <a:t>, teda čo najviac priblížiť jeho hodnotu k nule</a:t>
-            </a:r>
-          </a:p>
-          <a:p>
-            <a:r>
-              <a:rPr lang="sk-SK" dirty="0">
-                <a:effectLst/>
-              </a:rPr>
-              <a:t>Pomocou hodnoty r</a:t>
-            </a:r>
-            <a:r>
-              <a:rPr lang="sk-SK" baseline="30000" dirty="0">
-                <a:effectLst/>
-              </a:rPr>
-              <a:t>2</a:t>
-            </a:r>
-            <a:r>
-              <a:rPr lang="sk-SK" dirty="0">
-                <a:effectLst/>
-              </a:rPr>
-              <a:t> sa taktiež určuje úspešnosť lineárnej regresie, čo sa pri predchádzajúcich klasifikačných algoritmoch robilo pomocou techniky krížovej validácie</a:t>
-            </a:r>
-          </a:p>
-          <a:p>
-            <a:pPr marL="0" indent="0">
-              <a:buNone/>
-            </a:pPr>
-            <a:r>
-              <a:rPr lang="sk-SK" b="1" dirty="0">
-                <a:effectLst/>
-              </a:rPr>
-              <a:t>Napríklad – </a:t>
-            </a:r>
-            <a:r>
-              <a:rPr lang="sk-SK" b="1" dirty="0" err="1">
-                <a:effectLst/>
-              </a:rPr>
-              <a:t>logits</a:t>
-            </a:r>
-            <a:r>
-              <a:rPr lang="en-US" b="1" dirty="0">
-                <a:effectLst/>
-              </a:rPr>
-              <a:t>(</a:t>
-            </a:r>
-            <a:r>
-              <a:rPr lang="sk-SK" b="1" dirty="0">
-                <a:effectLst/>
-              </a:rPr>
-              <a:t>červená čiara</a:t>
-            </a:r>
-            <a:r>
-              <a:rPr lang="en-US" b="1" dirty="0">
-                <a:effectLst/>
-              </a:rPr>
-              <a:t>)</a:t>
-            </a:r>
-            <a:r>
-              <a:rPr lang="sk-SK" b="1" dirty="0">
-                <a:effectLst/>
-              </a:rPr>
-              <a:t> a </a:t>
-            </a:r>
-            <a:r>
-              <a:rPr lang="sk-SK" b="1" dirty="0" err="1">
-                <a:effectLst/>
-              </a:rPr>
-              <a:t>dataset</a:t>
-            </a:r>
-            <a:r>
-              <a:rPr lang="en-US" b="1" dirty="0">
-                <a:effectLst/>
-              </a:rPr>
-              <a:t>(</a:t>
-            </a:r>
-            <a:r>
-              <a:rPr lang="sk-SK" b="1" dirty="0">
-                <a:effectLst/>
-              </a:rPr>
-              <a:t>m</a:t>
-            </a:r>
-            <a:r>
-              <a:rPr lang="en-US" b="1" dirty="0" err="1">
-                <a:effectLst/>
-              </a:rPr>
-              <a:t>odr</a:t>
-            </a:r>
-            <a:r>
-              <a:rPr lang="sk-SK" b="1" dirty="0">
-                <a:effectLst/>
-              </a:rPr>
-              <a:t>é bodky</a:t>
-            </a:r>
-            <a:r>
-              <a:rPr lang="en-US" b="1" dirty="0">
-                <a:effectLst/>
-              </a:rPr>
-              <a:t>)</a:t>
-            </a:r>
-            <a:endParaRPr lang="sk-SK" b="1" dirty="0">
-              <a:effectLst/>
-            </a:endParaRPr>
-          </a:p>
-          <a:p>
-            <a:r>
-              <a:rPr lang="sk-SK" dirty="0">
-                <a:effectLst/>
-              </a:rPr>
-              <a:t>Na zistenie chýb</a:t>
-            </a:r>
-            <a:r>
-              <a:rPr lang="en-US" dirty="0">
-                <a:effectLst/>
-              </a:rPr>
-              <a:t>(cost/errors)</a:t>
-            </a:r>
-            <a:r>
-              <a:rPr lang="sk-SK" dirty="0">
-                <a:effectLst/>
-              </a:rPr>
-              <a:t> musí</a:t>
-            </a:r>
-            <a:r>
-              <a:rPr lang="en-US" dirty="0">
-                <a:effectLst/>
-              </a:rPr>
-              <a:t>m</a:t>
-            </a:r>
-            <a:r>
-              <a:rPr lang="sk-SK" dirty="0">
-                <a:effectLst/>
-              </a:rPr>
-              <a:t>e odčítať celú hodnotu modrých bodov červenou čiarou</a:t>
-            </a:r>
-            <a:endParaRPr lang="en-US" dirty="0">
-              <a:effectLst/>
-            </a:endParaRPr>
-          </a:p>
-          <a:p>
-            <a:r>
-              <a:rPr lang="sk-SK" dirty="0">
-                <a:effectLst/>
-              </a:rPr>
-              <a:t>Ďalej </a:t>
-            </a:r>
-            <a:r>
-              <a:rPr lang="en-US" dirty="0">
-                <a:effectLst/>
-              </a:rPr>
-              <a:t>zo </a:t>
-            </a:r>
-            <a:r>
-              <a:rPr lang="sk-SK" dirty="0">
-                <a:effectLst/>
-              </a:rPr>
-              <a:t>všetkých nájdených vzdialeností spravíme priemer</a:t>
-            </a:r>
-            <a:endParaRPr lang="en-US" dirty="0">
-              <a:effectLst/>
-            </a:endParaRPr>
-          </a:p>
-          <a:p>
-            <a:r>
-              <a:rPr lang="sk-SK" dirty="0">
-                <a:effectLst/>
-              </a:rPr>
-              <a:t>Pre dobrú pred</a:t>
-            </a:r>
-            <a:r>
-              <a:rPr lang="en-US" dirty="0" err="1">
-                <a:effectLst/>
-              </a:rPr>
-              <a:t>ikciu</a:t>
-            </a:r>
-            <a:r>
-              <a:rPr lang="sk-SK" dirty="0">
-                <a:effectLst/>
-              </a:rPr>
-              <a:t> musí byť táto priemerná vzdialenosť červenej čiary a modrej bodky minimálna hodnota</a:t>
-            </a:r>
-          </a:p>
-          <a:p>
-            <a:endParaRPr lang="sk-SK" dirty="0"/>
-          </a:p>
-        </p:txBody>
-      </p:sp>
-      <p:sp>
-        <p:nvSpPr>
-          <p:cNvPr id="4" name="Nadpis 1">
-            <a:extLst>
-              <a:ext uri="{FF2B5EF4-FFF2-40B4-BE49-F238E27FC236}">
-                <a16:creationId xmlns:a16="http://schemas.microsoft.com/office/drawing/2014/main" id="{88C51A8B-AE20-4F4E-A881-F92F3666668C}"/>
-              </a:ext>
-            </a:extLst>
-          </p:cNvPr>
-          <p:cNvSpPr>
-            <a:spLocks noGrp="1"/>
-          </p:cNvSpPr>
-          <p:nvPr>
-            <p:ph type="title"/>
-          </p:nvPr>
-        </p:nvSpPr>
-        <p:spPr>
-          <a:xfrm>
-            <a:off x="536897" y="483765"/>
-            <a:ext cx="9905998" cy="1030447"/>
-          </a:xfrm>
-        </p:spPr>
-        <p:txBody>
-          <a:bodyPr/>
-          <a:lstStyle/>
-          <a:p>
-            <a:r>
-              <a:rPr lang="en-US" dirty="0"/>
-              <a:t>CROSS ENTROPY</a:t>
-            </a:r>
-            <a:endParaRPr lang="sk-SK" dirty="0"/>
-          </a:p>
-        </p:txBody>
-      </p:sp>
-      <p:pic>
-        <p:nvPicPr>
-          <p:cNvPr id="6" name="Obrázok 5">
-            <a:extLst>
-              <a:ext uri="{FF2B5EF4-FFF2-40B4-BE49-F238E27FC236}">
-                <a16:creationId xmlns:a16="http://schemas.microsoft.com/office/drawing/2014/main" id="{E83F8C18-7D74-404B-963D-85879013DDB5}"/>
+                <a16:creationId xmlns:a16="http://schemas.microsoft.com/office/drawing/2014/main" id="{8EAB993B-A03D-4DC5-A926-257FC5C0059D}"/>
               </a:ext>
             </a:extLst>
           </p:cNvPr>
           <p:cNvPicPr>
-            <a:picLocks noChangeAspect="1"/>
+            <a:picLocks noGrp="1" noChangeAspect="1"/>
           </p:cNvPicPr>
-          <p:nvPr/>
+          <p:nvPr>
+            <p:ph idx="1"/>
+          </p:nvPr>
         </p:nvPicPr>
         <p:blipFill>
           <a:blip r:embed="rId2">
@@ -10149,18 +10952,15 @@
         </p:blipFill>
         <p:spPr>
           <a:xfrm>
-            <a:off x="7877264" y="2577165"/>
-            <a:ext cx="4116350" cy="2640788"/>
+            <a:off x="1718705" y="890243"/>
+            <a:ext cx="8754590" cy="5077513"/>
           </a:xfrm>
-          <a:prstGeom prst="rect">
-            <a:avLst/>
-          </a:prstGeom>
         </p:spPr>
       </p:pic>
     </p:spTree>
     <p:extLst>
       <p:ext uri="{BB962C8B-B14F-4D97-AF65-F5344CB8AC3E}">
-        <p14:creationId xmlns:p14="http://schemas.microsoft.com/office/powerpoint/2010/main" val="2462912733"/>
+        <p14:creationId xmlns:p14="http://schemas.microsoft.com/office/powerpoint/2010/main" val="539526711"/>
       </p:ext>
     </p:extLst>
   </p:cSld>

</xml_diff>